<commit_message>
Adding more compare features to satisfy exercise requirements.
</commit_message>
<xml_diff>
--- a/Data Migration Analysis.pptx
+++ b/Data Migration Analysis.pptx
@@ -5,7 +5,7 @@
     <p:sldMasterId id="2147483648" r:id="rId1"/>
   </p:sldMasterIdLst>
   <p:notesMasterIdLst>
-    <p:notesMasterId r:id="rId14"/>
+    <p:notesMasterId r:id="rId15"/>
   </p:notesMasterIdLst>
   <p:sldIdLst>
     <p:sldId id="256" r:id="rId2"/>
@@ -18,8 +18,9 @@
     <p:sldId id="263" r:id="rId9"/>
     <p:sldId id="264" r:id="rId10"/>
     <p:sldId id="265" r:id="rId11"/>
-    <p:sldId id="267" r:id="rId12"/>
-    <p:sldId id="266" r:id="rId13"/>
+    <p:sldId id="268" r:id="rId12"/>
+    <p:sldId id="267" r:id="rId13"/>
+    <p:sldId id="266" r:id="rId14"/>
   </p:sldIdLst>
   <p:sldSz cx="12192000" cy="6858000"/>
   <p:notesSz cx="6858000" cy="9144000"/>
@@ -118,6 +119,11 @@
       </a:defRPr>
     </a:lvl9pPr>
   </p:defaultTextStyle>
+  <p:extLst>
+    <p:ext uri="{EFAFB233-063F-42B5-8137-9DF3F51BA10A}">
+      <p15:sldGuideLst xmlns:p15="http://schemas.microsoft.com/office/powerpoint/2012/main"/>
+    </p:ext>
+  </p:extLst>
 </p:presentation>
 </file>
 
@@ -981,44 +987,47 @@
   <cx:chart>
     <cx:title pos="t" align="ctr" overlay="0">
       <cx:tx>
-        <cx:rich>
-          <a:bodyPr rot="0" spcFirstLastPara="1" vertOverflow="ellipsis" vert="horz" wrap="square" lIns="38100" tIns="19050" rIns="38100" bIns="19050" anchor="ctr" anchorCtr="1" compatLnSpc="0"/>
-          <a:lstStyle/>
-          <a:p>
-            <a:pPr algn="ctr" rtl="0">
-              <a:defRPr sz="1400" b="0" i="0" u="none" strike="noStrike" kern="1200" spc="0" baseline="0">
-                <a:solidFill>
-                  <a:sysClr val="windowText" lastClr="000000">
-                    <a:lumMod val="65000"/>
-                    <a:lumOff val="35000"/>
-                  </a:sysClr>
-                </a:solidFill>
-                <a:latin typeface="+mn-lt"/>
-                <a:ea typeface="+mn-ea"/>
-                <a:cs typeface="+mn-cs"/>
-              </a:defRPr>
-            </a:pPr>
-            <a:r>
-              <a:rPr kumimoji="0" lang="en-US" sz="1400" b="0" i="0" u="none" strike="noStrike" kern="1200" cap="none" spc="0" normalizeH="0" baseline="0" noProof="0" dirty="0">
-                <a:ln>
-                  <a:noFill/>
-                </a:ln>
-                <a:solidFill>
-                  <a:sysClr val="windowText" lastClr="000000">
-                    <a:lumMod val="65000"/>
-                    <a:lumOff val="35000"/>
-                  </a:sysClr>
-                </a:solidFill>
-                <a:effectLst/>
-                <a:uLnTx/>
-                <a:uFillTx/>
-                <a:latin typeface="Aptos Narrow" panose="02110004020202020204"/>
-              </a:rPr>
-              <a:t>FINANCIAL VARIANCE</a:t>
-            </a:r>
-          </a:p>
-        </cx:rich>
+        <cx:txData>
+          <cx:v>FINANCIAL VARIANCE</cx:v>
+        </cx:txData>
       </cx:tx>
+      <cx:txPr>
+        <a:bodyPr rot="0" spcFirstLastPara="1" vertOverflow="ellipsis" vert="horz" wrap="square" lIns="38100" tIns="19050" rIns="38100" bIns="19050" anchor="ctr" anchorCtr="1" compatLnSpc="0"/>
+        <a:lstStyle/>
+        <a:p>
+          <a:pPr algn="ctr" rtl="0">
+            <a:defRPr sz="1400" b="0" i="0" u="none" strike="noStrike" kern="1200" spc="0" baseline="0">
+              <a:solidFill>
+                <a:sysClr val="windowText" lastClr="000000">
+                  <a:lumMod val="65000"/>
+                  <a:lumOff val="35000"/>
+                </a:sysClr>
+              </a:solidFill>
+              <a:latin typeface="+mn-lt"/>
+              <a:ea typeface="+mn-ea"/>
+              <a:cs typeface="+mn-cs"/>
+            </a:defRPr>
+          </a:pPr>
+          <a:r>
+            <a:rPr kumimoji="0" lang="en-US" sz="1400" b="0" i="0" u="none" strike="noStrike" kern="1200" cap="none" spc="0" normalizeH="0" baseline="0" noProof="0" dirty="0">
+              <a:ln>
+                <a:noFill/>
+              </a:ln>
+              <a:solidFill>
+                <a:sysClr val="windowText" lastClr="000000">
+                  <a:lumMod val="65000"/>
+                  <a:lumOff val="35000"/>
+                </a:sysClr>
+              </a:solidFill>
+              <a:effectLst/>
+              <a:uLnTx/>
+              <a:uFillTx/>
+              <a:latin typeface="Aptos Narrow" panose="02110004020202020204"/>
+            </a:rPr>
+            <a:t>FINANCIAL VARIANCE</a:t>
+          </a:r>
+        </a:p>
+      </cx:txPr>
     </cx:title>
     <cx:plotArea>
       <cx:plotAreaRegion>
@@ -1089,44 +1098,47 @@
   <cx:chart>
     <cx:title pos="t" align="ctr" overlay="0">
       <cx:tx>
-        <cx:rich>
-          <a:bodyPr rot="0" spcFirstLastPara="1" vertOverflow="ellipsis" vert="horz" wrap="square" lIns="38100" tIns="19050" rIns="38100" bIns="19050" anchor="ctr" anchorCtr="1" compatLnSpc="0"/>
-          <a:lstStyle/>
-          <a:p>
-            <a:pPr algn="ctr" rtl="0">
-              <a:defRPr sz="1400" b="0" i="0" u="none" strike="noStrike" kern="1200" spc="0" baseline="0">
-                <a:solidFill>
-                  <a:sysClr val="windowText" lastClr="000000">
-                    <a:lumMod val="65000"/>
-                    <a:lumOff val="35000"/>
-                  </a:sysClr>
-                </a:solidFill>
-                <a:latin typeface="+mn-lt"/>
-                <a:ea typeface="+mn-ea"/>
-                <a:cs typeface="+mn-cs"/>
-              </a:defRPr>
-            </a:pPr>
-            <a:r>
-              <a:rPr kumimoji="0" lang="en-US" sz="1400" b="0" i="0" u="none" strike="noStrike" kern="1200" cap="none" spc="0" normalizeH="0" baseline="0" noProof="0" dirty="0">
-                <a:ln>
-                  <a:noFill/>
-                </a:ln>
-                <a:solidFill>
-                  <a:sysClr val="windowText" lastClr="000000">
-                    <a:lumMod val="65000"/>
-                    <a:lumOff val="35000"/>
-                  </a:sysClr>
-                </a:solidFill>
-                <a:effectLst/>
-                <a:uLnTx/>
-                <a:uFillTx/>
-                <a:latin typeface="Aptos Narrow" panose="02110004020202020204"/>
-              </a:rPr>
-              <a:t>FINANCIAL VARIANCE</a:t>
-            </a:r>
-          </a:p>
-        </cx:rich>
+        <cx:txData>
+          <cx:v>FINANCIAL VARIANCE</cx:v>
+        </cx:txData>
       </cx:tx>
+      <cx:txPr>
+        <a:bodyPr rot="0" spcFirstLastPara="1" vertOverflow="ellipsis" vert="horz" wrap="square" lIns="38100" tIns="19050" rIns="38100" bIns="19050" anchor="ctr" anchorCtr="1" compatLnSpc="0"/>
+        <a:lstStyle/>
+        <a:p>
+          <a:pPr algn="ctr" rtl="0">
+            <a:defRPr sz="1400" b="0" i="0" u="none" strike="noStrike" kern="1200" spc="0" baseline="0">
+              <a:solidFill>
+                <a:sysClr val="windowText" lastClr="000000">
+                  <a:lumMod val="65000"/>
+                  <a:lumOff val="35000"/>
+                </a:sysClr>
+              </a:solidFill>
+              <a:latin typeface="+mn-lt"/>
+              <a:ea typeface="+mn-ea"/>
+              <a:cs typeface="+mn-cs"/>
+            </a:defRPr>
+          </a:pPr>
+          <a:r>
+            <a:rPr kumimoji="0" lang="en-US" sz="1400" b="0" i="0" u="none" strike="noStrike" kern="1200" cap="none" spc="0" normalizeH="0" baseline="0" noProof="0" dirty="0">
+              <a:ln>
+                <a:noFill/>
+              </a:ln>
+              <a:solidFill>
+                <a:sysClr val="windowText" lastClr="000000">
+                  <a:lumMod val="65000"/>
+                  <a:lumOff val="35000"/>
+                </a:sysClr>
+              </a:solidFill>
+              <a:effectLst/>
+              <a:uLnTx/>
+              <a:uFillTx/>
+              <a:latin typeface="Aptos Narrow" panose="02110004020202020204"/>
+            </a:rPr>
+            <a:t>FINANCIAL VARIANCE</a:t>
+          </a:r>
+        </a:p>
+      </cx:txPr>
     </cx:title>
     <cx:plotArea>
       <cx:plotAreaRegion>
@@ -4464,6 +4476,753 @@
 </dgm:colorsDef>
 </file>
 
+<file path=ppt/diagrams/colors3.xml><?xml version="1.0" encoding="utf-8"?>
+<dgm:colorsDef xmlns:dgm="http://schemas.openxmlformats.org/drawingml/2006/diagram" xmlns:a="http://schemas.openxmlformats.org/drawingml/2006/main" uniqueId="urn:microsoft.com/office/officeart/2005/8/colors/accent1_2">
+  <dgm:title val=""/>
+  <dgm:desc val=""/>
+  <dgm:catLst>
+    <dgm:cat type="accent1" pri="11200"/>
+  </dgm:catLst>
+  <dgm:styleLbl name="node0">
+    <dgm:fillClrLst meth="repeat">
+      <a:schemeClr val="accent1"/>
+    </dgm:fillClrLst>
+    <dgm:linClrLst meth="repeat">
+      <a:schemeClr val="lt1"/>
+    </dgm:linClrLst>
+    <dgm:effectClrLst/>
+    <dgm:txLinClrLst/>
+    <dgm:txFillClrLst/>
+    <dgm:txEffectClrLst/>
+  </dgm:styleLbl>
+  <dgm:styleLbl name="alignNode1">
+    <dgm:fillClrLst meth="repeat">
+      <a:schemeClr val="accent1"/>
+    </dgm:fillClrLst>
+    <dgm:linClrLst meth="repeat">
+      <a:schemeClr val="accent1"/>
+    </dgm:linClrLst>
+    <dgm:effectClrLst/>
+    <dgm:txLinClrLst/>
+    <dgm:txFillClrLst/>
+    <dgm:txEffectClrLst/>
+  </dgm:styleLbl>
+  <dgm:styleLbl name="node1">
+    <dgm:fillClrLst meth="repeat">
+      <a:schemeClr val="accent1"/>
+    </dgm:fillClrLst>
+    <dgm:linClrLst meth="repeat">
+      <a:schemeClr val="lt1"/>
+    </dgm:linClrLst>
+    <dgm:effectClrLst/>
+    <dgm:txLinClrLst/>
+    <dgm:txFillClrLst/>
+    <dgm:txEffectClrLst/>
+  </dgm:styleLbl>
+  <dgm:styleLbl name="lnNode1">
+    <dgm:fillClrLst meth="repeat">
+      <a:schemeClr val="accent1"/>
+    </dgm:fillClrLst>
+    <dgm:linClrLst meth="repeat">
+      <a:schemeClr val="lt1"/>
+    </dgm:linClrLst>
+    <dgm:effectClrLst/>
+    <dgm:txLinClrLst/>
+    <dgm:txFillClrLst/>
+    <dgm:txEffectClrLst/>
+  </dgm:styleLbl>
+  <dgm:styleLbl name="vennNode1">
+    <dgm:fillClrLst meth="repeat">
+      <a:schemeClr val="accent1">
+        <a:alpha val="50000"/>
+      </a:schemeClr>
+    </dgm:fillClrLst>
+    <dgm:linClrLst meth="repeat">
+      <a:schemeClr val="lt1"/>
+    </dgm:linClrLst>
+    <dgm:effectClrLst/>
+    <dgm:txLinClrLst/>
+    <dgm:txFillClrLst/>
+    <dgm:txEffectClrLst/>
+  </dgm:styleLbl>
+  <dgm:styleLbl name="node2">
+    <dgm:fillClrLst meth="repeat">
+      <a:schemeClr val="accent1"/>
+    </dgm:fillClrLst>
+    <dgm:linClrLst meth="repeat">
+      <a:schemeClr val="lt1"/>
+    </dgm:linClrLst>
+    <dgm:effectClrLst/>
+    <dgm:txLinClrLst/>
+    <dgm:txFillClrLst/>
+    <dgm:txEffectClrLst/>
+  </dgm:styleLbl>
+  <dgm:styleLbl name="node3">
+    <dgm:fillClrLst meth="repeat">
+      <a:schemeClr val="accent1"/>
+    </dgm:fillClrLst>
+    <dgm:linClrLst meth="repeat">
+      <a:schemeClr val="lt1"/>
+    </dgm:linClrLst>
+    <dgm:effectClrLst/>
+    <dgm:txLinClrLst/>
+    <dgm:txFillClrLst/>
+    <dgm:txEffectClrLst/>
+  </dgm:styleLbl>
+  <dgm:styleLbl name="node4">
+    <dgm:fillClrLst meth="repeat">
+      <a:schemeClr val="accent1"/>
+    </dgm:fillClrLst>
+    <dgm:linClrLst meth="repeat">
+      <a:schemeClr val="lt1"/>
+    </dgm:linClrLst>
+    <dgm:effectClrLst/>
+    <dgm:txLinClrLst/>
+    <dgm:txFillClrLst/>
+    <dgm:txEffectClrLst/>
+  </dgm:styleLbl>
+  <dgm:styleLbl name="fgImgPlace1">
+    <dgm:fillClrLst meth="repeat">
+      <a:schemeClr val="accent1">
+        <a:tint val="50000"/>
+      </a:schemeClr>
+    </dgm:fillClrLst>
+    <dgm:linClrLst meth="repeat">
+      <a:schemeClr val="lt1"/>
+    </dgm:linClrLst>
+    <dgm:effectClrLst/>
+    <dgm:txLinClrLst/>
+    <dgm:txFillClrLst meth="repeat">
+      <a:schemeClr val="lt1"/>
+    </dgm:txFillClrLst>
+    <dgm:txEffectClrLst/>
+  </dgm:styleLbl>
+  <dgm:styleLbl name="alignImgPlace1">
+    <dgm:fillClrLst meth="repeat">
+      <a:schemeClr val="accent1">
+        <a:tint val="50000"/>
+      </a:schemeClr>
+    </dgm:fillClrLst>
+    <dgm:linClrLst meth="repeat">
+      <a:schemeClr val="lt1"/>
+    </dgm:linClrLst>
+    <dgm:effectClrLst/>
+    <dgm:txLinClrLst/>
+    <dgm:txFillClrLst meth="repeat">
+      <a:schemeClr val="lt1"/>
+    </dgm:txFillClrLst>
+    <dgm:txEffectClrLst/>
+  </dgm:styleLbl>
+  <dgm:styleLbl name="bgImgPlace1">
+    <dgm:fillClrLst meth="repeat">
+      <a:schemeClr val="accent1">
+        <a:tint val="50000"/>
+      </a:schemeClr>
+    </dgm:fillClrLst>
+    <dgm:linClrLst meth="repeat">
+      <a:schemeClr val="lt1"/>
+    </dgm:linClrLst>
+    <dgm:effectClrLst/>
+    <dgm:txLinClrLst/>
+    <dgm:txFillClrLst meth="repeat">
+      <a:schemeClr val="lt1"/>
+    </dgm:txFillClrLst>
+    <dgm:txEffectClrLst/>
+  </dgm:styleLbl>
+  <dgm:styleLbl name="sibTrans2D1">
+    <dgm:fillClrLst meth="repeat">
+      <a:schemeClr val="accent1">
+        <a:tint val="60000"/>
+      </a:schemeClr>
+    </dgm:fillClrLst>
+    <dgm:linClrLst meth="repeat">
+      <a:schemeClr val="accent1">
+        <a:tint val="60000"/>
+      </a:schemeClr>
+    </dgm:linClrLst>
+    <dgm:effectClrLst/>
+    <dgm:txLinClrLst/>
+    <dgm:txFillClrLst/>
+    <dgm:txEffectClrLst/>
+  </dgm:styleLbl>
+  <dgm:styleLbl name="fgSibTrans2D1">
+    <dgm:fillClrLst meth="repeat">
+      <a:schemeClr val="accent1">
+        <a:tint val="60000"/>
+      </a:schemeClr>
+    </dgm:fillClrLst>
+    <dgm:linClrLst meth="repeat">
+      <a:schemeClr val="accent1">
+        <a:tint val="60000"/>
+      </a:schemeClr>
+    </dgm:linClrLst>
+    <dgm:effectClrLst/>
+    <dgm:txLinClrLst/>
+    <dgm:txFillClrLst/>
+    <dgm:txEffectClrLst/>
+  </dgm:styleLbl>
+  <dgm:styleLbl name="bgSibTrans2D1">
+    <dgm:fillClrLst meth="repeat">
+      <a:schemeClr val="accent1">
+        <a:tint val="60000"/>
+      </a:schemeClr>
+    </dgm:fillClrLst>
+    <dgm:linClrLst meth="repeat">
+      <a:schemeClr val="accent1">
+        <a:tint val="60000"/>
+      </a:schemeClr>
+    </dgm:linClrLst>
+    <dgm:effectClrLst/>
+    <dgm:txLinClrLst/>
+    <dgm:txFillClrLst/>
+    <dgm:txEffectClrLst/>
+  </dgm:styleLbl>
+  <dgm:styleLbl name="sibTrans1D1">
+    <dgm:fillClrLst meth="repeat">
+      <a:schemeClr val="accent1"/>
+    </dgm:fillClrLst>
+    <dgm:linClrLst meth="repeat">
+      <a:schemeClr val="accent1"/>
+    </dgm:linClrLst>
+    <dgm:effectClrLst/>
+    <dgm:txLinClrLst/>
+    <dgm:txFillClrLst meth="repeat">
+      <a:schemeClr val="tx1"/>
+    </dgm:txFillClrLst>
+    <dgm:txEffectClrLst/>
+  </dgm:styleLbl>
+  <dgm:styleLbl name="callout">
+    <dgm:fillClrLst meth="repeat">
+      <a:schemeClr val="accent1"/>
+    </dgm:fillClrLst>
+    <dgm:linClrLst meth="repeat">
+      <a:schemeClr val="accent1">
+        <a:tint val="50000"/>
+      </a:schemeClr>
+    </dgm:linClrLst>
+    <dgm:effectClrLst/>
+    <dgm:txLinClrLst/>
+    <dgm:txFillClrLst meth="repeat">
+      <a:schemeClr val="tx1"/>
+    </dgm:txFillClrLst>
+    <dgm:txEffectClrLst/>
+  </dgm:styleLbl>
+  <dgm:styleLbl name="asst0">
+    <dgm:fillClrLst meth="repeat">
+      <a:schemeClr val="accent1"/>
+    </dgm:fillClrLst>
+    <dgm:linClrLst meth="repeat">
+      <a:schemeClr val="lt1"/>
+    </dgm:linClrLst>
+    <dgm:effectClrLst/>
+    <dgm:txLinClrLst/>
+    <dgm:txFillClrLst/>
+    <dgm:txEffectClrLst/>
+  </dgm:styleLbl>
+  <dgm:styleLbl name="asst1">
+    <dgm:fillClrLst meth="repeat">
+      <a:schemeClr val="accent1"/>
+    </dgm:fillClrLst>
+    <dgm:linClrLst meth="repeat">
+      <a:schemeClr val="lt1"/>
+    </dgm:linClrLst>
+    <dgm:effectClrLst/>
+    <dgm:txLinClrLst/>
+    <dgm:txFillClrLst/>
+    <dgm:txEffectClrLst/>
+  </dgm:styleLbl>
+  <dgm:styleLbl name="asst2">
+    <dgm:fillClrLst meth="repeat">
+      <a:schemeClr val="accent1"/>
+    </dgm:fillClrLst>
+    <dgm:linClrLst meth="repeat">
+      <a:schemeClr val="lt1"/>
+    </dgm:linClrLst>
+    <dgm:effectClrLst/>
+    <dgm:txLinClrLst/>
+    <dgm:txFillClrLst/>
+    <dgm:txEffectClrLst/>
+  </dgm:styleLbl>
+  <dgm:styleLbl name="asst3">
+    <dgm:fillClrLst meth="repeat">
+      <a:schemeClr val="accent1"/>
+    </dgm:fillClrLst>
+    <dgm:linClrLst meth="repeat">
+      <a:schemeClr val="lt1"/>
+    </dgm:linClrLst>
+    <dgm:effectClrLst/>
+    <dgm:txLinClrLst/>
+    <dgm:txFillClrLst/>
+    <dgm:txEffectClrLst/>
+  </dgm:styleLbl>
+  <dgm:styleLbl name="asst4">
+    <dgm:fillClrLst meth="repeat">
+      <a:schemeClr val="accent1"/>
+    </dgm:fillClrLst>
+    <dgm:linClrLst meth="repeat">
+      <a:schemeClr val="lt1"/>
+    </dgm:linClrLst>
+    <dgm:effectClrLst/>
+    <dgm:txLinClrLst/>
+    <dgm:txFillClrLst/>
+    <dgm:txEffectClrLst/>
+  </dgm:styleLbl>
+  <dgm:styleLbl name="parChTrans2D1">
+    <dgm:fillClrLst meth="repeat">
+      <a:schemeClr val="accent1">
+        <a:tint val="60000"/>
+      </a:schemeClr>
+    </dgm:fillClrLst>
+    <dgm:linClrLst meth="repeat">
+      <a:schemeClr val="accent1">
+        <a:tint val="60000"/>
+      </a:schemeClr>
+    </dgm:linClrLst>
+    <dgm:effectClrLst/>
+    <dgm:txLinClrLst/>
+    <dgm:txFillClrLst meth="repeat">
+      <a:schemeClr val="lt1"/>
+    </dgm:txFillClrLst>
+    <dgm:txEffectClrLst/>
+  </dgm:styleLbl>
+  <dgm:styleLbl name="parChTrans2D2">
+    <dgm:fillClrLst meth="repeat">
+      <a:schemeClr val="accent1"/>
+    </dgm:fillClrLst>
+    <dgm:linClrLst meth="repeat">
+      <a:schemeClr val="accent1"/>
+    </dgm:linClrLst>
+    <dgm:effectClrLst/>
+    <dgm:txLinClrLst/>
+    <dgm:txFillClrLst meth="repeat">
+      <a:schemeClr val="lt1"/>
+    </dgm:txFillClrLst>
+    <dgm:txEffectClrLst/>
+  </dgm:styleLbl>
+  <dgm:styleLbl name="parChTrans2D3">
+    <dgm:fillClrLst meth="repeat">
+      <a:schemeClr val="accent1"/>
+    </dgm:fillClrLst>
+    <dgm:linClrLst meth="repeat">
+      <a:schemeClr val="accent1"/>
+    </dgm:linClrLst>
+    <dgm:effectClrLst/>
+    <dgm:txLinClrLst/>
+    <dgm:txFillClrLst meth="repeat">
+      <a:schemeClr val="lt1"/>
+    </dgm:txFillClrLst>
+    <dgm:txEffectClrLst/>
+  </dgm:styleLbl>
+  <dgm:styleLbl name="parChTrans2D4">
+    <dgm:fillClrLst meth="repeat">
+      <a:schemeClr val="accent1"/>
+    </dgm:fillClrLst>
+    <dgm:linClrLst meth="repeat">
+      <a:schemeClr val="accent1"/>
+    </dgm:linClrLst>
+    <dgm:effectClrLst/>
+    <dgm:txLinClrLst/>
+    <dgm:txFillClrLst meth="repeat">
+      <a:schemeClr val="lt1"/>
+    </dgm:txFillClrLst>
+    <dgm:txEffectClrLst/>
+  </dgm:styleLbl>
+  <dgm:styleLbl name="parChTrans1D1">
+    <dgm:fillClrLst meth="repeat">
+      <a:schemeClr val="accent1"/>
+    </dgm:fillClrLst>
+    <dgm:linClrLst meth="repeat">
+      <a:schemeClr val="accent1">
+        <a:shade val="60000"/>
+      </a:schemeClr>
+    </dgm:linClrLst>
+    <dgm:effectClrLst/>
+    <dgm:txLinClrLst/>
+    <dgm:txFillClrLst meth="repeat">
+      <a:schemeClr val="tx1"/>
+    </dgm:txFillClrLst>
+    <dgm:txEffectClrLst/>
+  </dgm:styleLbl>
+  <dgm:styleLbl name="parChTrans1D2">
+    <dgm:fillClrLst meth="repeat">
+      <a:schemeClr val="accent1"/>
+    </dgm:fillClrLst>
+    <dgm:linClrLst meth="repeat">
+      <a:schemeClr val="accent1">
+        <a:shade val="60000"/>
+      </a:schemeClr>
+    </dgm:linClrLst>
+    <dgm:effectClrLst/>
+    <dgm:txLinClrLst/>
+    <dgm:txFillClrLst meth="repeat">
+      <a:schemeClr val="tx1"/>
+    </dgm:txFillClrLst>
+    <dgm:txEffectClrLst/>
+  </dgm:styleLbl>
+  <dgm:styleLbl name="parChTrans1D3">
+    <dgm:fillClrLst meth="repeat">
+      <a:schemeClr val="accent1"/>
+    </dgm:fillClrLst>
+    <dgm:linClrLst meth="repeat">
+      <a:schemeClr val="accent1">
+        <a:shade val="80000"/>
+      </a:schemeClr>
+    </dgm:linClrLst>
+    <dgm:effectClrLst/>
+    <dgm:txLinClrLst/>
+    <dgm:txFillClrLst meth="repeat">
+      <a:schemeClr val="tx1"/>
+    </dgm:txFillClrLst>
+    <dgm:txEffectClrLst/>
+  </dgm:styleLbl>
+  <dgm:styleLbl name="parChTrans1D4">
+    <dgm:fillClrLst meth="repeat">
+      <a:schemeClr val="accent1"/>
+    </dgm:fillClrLst>
+    <dgm:linClrLst meth="repeat">
+      <a:schemeClr val="accent1">
+        <a:shade val="80000"/>
+      </a:schemeClr>
+    </dgm:linClrLst>
+    <dgm:effectClrLst/>
+    <dgm:txLinClrLst/>
+    <dgm:txFillClrLst meth="repeat">
+      <a:schemeClr val="tx1"/>
+    </dgm:txFillClrLst>
+    <dgm:txEffectClrLst/>
+  </dgm:styleLbl>
+  <dgm:styleLbl name="fgAcc1">
+    <dgm:fillClrLst meth="repeat">
+      <a:schemeClr val="lt1">
+        <a:alpha val="90000"/>
+      </a:schemeClr>
+    </dgm:fillClrLst>
+    <dgm:linClrLst meth="repeat">
+      <a:schemeClr val="accent1"/>
+    </dgm:linClrLst>
+    <dgm:effectClrLst/>
+    <dgm:txLinClrLst/>
+    <dgm:txFillClrLst meth="repeat">
+      <a:schemeClr val="dk1"/>
+    </dgm:txFillClrLst>
+    <dgm:txEffectClrLst/>
+  </dgm:styleLbl>
+  <dgm:styleLbl name="conFgAcc1">
+    <dgm:fillClrLst meth="repeat">
+      <a:schemeClr val="lt1">
+        <a:alpha val="90000"/>
+      </a:schemeClr>
+    </dgm:fillClrLst>
+    <dgm:linClrLst meth="repeat">
+      <a:schemeClr val="accent1"/>
+    </dgm:linClrLst>
+    <dgm:effectClrLst/>
+    <dgm:txLinClrLst/>
+    <dgm:txFillClrLst meth="repeat">
+      <a:schemeClr val="dk1"/>
+    </dgm:txFillClrLst>
+    <dgm:txEffectClrLst/>
+  </dgm:styleLbl>
+  <dgm:styleLbl name="alignAcc1">
+    <dgm:fillClrLst meth="repeat">
+      <a:schemeClr val="lt1">
+        <a:alpha val="90000"/>
+      </a:schemeClr>
+    </dgm:fillClrLst>
+    <dgm:linClrLst meth="repeat">
+      <a:schemeClr val="accent1"/>
+    </dgm:linClrLst>
+    <dgm:effectClrLst/>
+    <dgm:txLinClrLst/>
+    <dgm:txFillClrLst meth="repeat">
+      <a:schemeClr val="dk1"/>
+    </dgm:txFillClrLst>
+    <dgm:txEffectClrLst/>
+  </dgm:styleLbl>
+  <dgm:styleLbl name="trAlignAcc1">
+    <dgm:fillClrLst meth="repeat">
+      <a:schemeClr val="lt1">
+        <a:alpha val="40000"/>
+      </a:schemeClr>
+    </dgm:fillClrLst>
+    <dgm:linClrLst meth="repeat">
+      <a:schemeClr val="accent1"/>
+    </dgm:linClrLst>
+    <dgm:effectClrLst/>
+    <dgm:txLinClrLst/>
+    <dgm:txFillClrLst meth="repeat">
+      <a:schemeClr val="dk1"/>
+    </dgm:txFillClrLst>
+    <dgm:txEffectClrLst/>
+  </dgm:styleLbl>
+  <dgm:styleLbl name="bgAcc1">
+    <dgm:fillClrLst meth="repeat">
+      <a:schemeClr val="lt1">
+        <a:alpha val="90000"/>
+      </a:schemeClr>
+    </dgm:fillClrLst>
+    <dgm:linClrLst meth="repeat">
+      <a:schemeClr val="accent1"/>
+    </dgm:linClrLst>
+    <dgm:effectClrLst/>
+    <dgm:txLinClrLst/>
+    <dgm:txFillClrLst meth="repeat">
+      <a:schemeClr val="dk1"/>
+    </dgm:txFillClrLst>
+    <dgm:txEffectClrLst/>
+  </dgm:styleLbl>
+  <dgm:styleLbl name="solidFgAcc1">
+    <dgm:fillClrLst meth="repeat">
+      <a:schemeClr val="lt1"/>
+    </dgm:fillClrLst>
+    <dgm:linClrLst meth="repeat">
+      <a:schemeClr val="accent1"/>
+    </dgm:linClrLst>
+    <dgm:effectClrLst/>
+    <dgm:txLinClrLst/>
+    <dgm:txFillClrLst meth="repeat">
+      <a:schemeClr val="dk1"/>
+    </dgm:txFillClrLst>
+    <dgm:txEffectClrLst/>
+  </dgm:styleLbl>
+  <dgm:styleLbl name="solidAlignAcc1">
+    <dgm:fillClrLst meth="repeat">
+      <a:schemeClr val="lt1"/>
+    </dgm:fillClrLst>
+    <dgm:linClrLst meth="repeat">
+      <a:schemeClr val="accent1"/>
+    </dgm:linClrLst>
+    <dgm:effectClrLst/>
+    <dgm:txLinClrLst/>
+    <dgm:txFillClrLst meth="repeat">
+      <a:schemeClr val="dk1"/>
+    </dgm:txFillClrLst>
+    <dgm:txEffectClrLst/>
+  </dgm:styleLbl>
+  <dgm:styleLbl name="solidBgAcc1">
+    <dgm:fillClrLst meth="repeat">
+      <a:schemeClr val="lt1"/>
+    </dgm:fillClrLst>
+    <dgm:linClrLst meth="repeat">
+      <a:schemeClr val="accent1"/>
+    </dgm:linClrLst>
+    <dgm:effectClrLst/>
+    <dgm:txLinClrLst/>
+    <dgm:txFillClrLst meth="repeat">
+      <a:schemeClr val="dk1"/>
+    </dgm:txFillClrLst>
+    <dgm:txEffectClrLst/>
+  </dgm:styleLbl>
+  <dgm:styleLbl name="fgAccFollowNode1">
+    <dgm:fillClrLst meth="repeat">
+      <a:schemeClr val="accent1">
+        <a:alpha val="90000"/>
+        <a:tint val="40000"/>
+      </a:schemeClr>
+    </dgm:fillClrLst>
+    <dgm:linClrLst meth="repeat">
+      <a:schemeClr val="accent1">
+        <a:alpha val="90000"/>
+        <a:tint val="40000"/>
+      </a:schemeClr>
+    </dgm:linClrLst>
+    <dgm:effectClrLst/>
+    <dgm:txLinClrLst/>
+    <dgm:txFillClrLst meth="repeat">
+      <a:schemeClr val="dk1"/>
+    </dgm:txFillClrLst>
+    <dgm:txEffectClrLst/>
+  </dgm:styleLbl>
+  <dgm:styleLbl name="alignAccFollowNode1">
+    <dgm:fillClrLst meth="repeat">
+      <a:schemeClr val="accent1">
+        <a:alpha val="90000"/>
+        <a:tint val="40000"/>
+      </a:schemeClr>
+    </dgm:fillClrLst>
+    <dgm:linClrLst meth="repeat">
+      <a:schemeClr val="accent1">
+        <a:alpha val="90000"/>
+        <a:tint val="40000"/>
+      </a:schemeClr>
+    </dgm:linClrLst>
+    <dgm:effectClrLst/>
+    <dgm:txLinClrLst/>
+    <dgm:txFillClrLst meth="repeat">
+      <a:schemeClr val="dk1"/>
+    </dgm:txFillClrLst>
+    <dgm:txEffectClrLst/>
+  </dgm:styleLbl>
+  <dgm:styleLbl name="bgAccFollowNode1">
+    <dgm:fillClrLst meth="repeat">
+      <a:schemeClr val="accent1">
+        <a:alpha val="90000"/>
+        <a:tint val="40000"/>
+      </a:schemeClr>
+    </dgm:fillClrLst>
+    <dgm:linClrLst meth="repeat">
+      <a:schemeClr val="accent1">
+        <a:alpha val="90000"/>
+        <a:tint val="40000"/>
+      </a:schemeClr>
+    </dgm:linClrLst>
+    <dgm:effectClrLst/>
+    <dgm:txLinClrLst/>
+    <dgm:txFillClrLst meth="repeat">
+      <a:schemeClr val="dk1"/>
+    </dgm:txFillClrLst>
+    <dgm:txEffectClrLst/>
+  </dgm:styleLbl>
+  <dgm:styleLbl name="fgAcc0">
+    <dgm:fillClrLst meth="repeat">
+      <a:schemeClr val="lt1">
+        <a:alpha val="90000"/>
+      </a:schemeClr>
+    </dgm:fillClrLst>
+    <dgm:linClrLst meth="repeat">
+      <a:schemeClr val="accent1"/>
+    </dgm:linClrLst>
+    <dgm:effectClrLst/>
+    <dgm:txLinClrLst/>
+    <dgm:txFillClrLst meth="repeat">
+      <a:schemeClr val="dk1"/>
+    </dgm:txFillClrLst>
+    <dgm:txEffectClrLst/>
+  </dgm:styleLbl>
+  <dgm:styleLbl name="fgAcc2">
+    <dgm:fillClrLst meth="repeat">
+      <a:schemeClr val="lt1">
+        <a:alpha val="90000"/>
+      </a:schemeClr>
+    </dgm:fillClrLst>
+    <dgm:linClrLst meth="repeat">
+      <a:schemeClr val="accent1"/>
+    </dgm:linClrLst>
+    <dgm:effectClrLst/>
+    <dgm:txLinClrLst/>
+    <dgm:txFillClrLst meth="repeat">
+      <a:schemeClr val="dk1"/>
+    </dgm:txFillClrLst>
+    <dgm:txEffectClrLst/>
+  </dgm:styleLbl>
+  <dgm:styleLbl name="fgAcc3">
+    <dgm:fillClrLst meth="repeat">
+      <a:schemeClr val="lt1">
+        <a:alpha val="90000"/>
+      </a:schemeClr>
+    </dgm:fillClrLst>
+    <dgm:linClrLst meth="repeat">
+      <a:schemeClr val="accent1"/>
+    </dgm:linClrLst>
+    <dgm:effectClrLst/>
+    <dgm:txLinClrLst/>
+    <dgm:txFillClrLst meth="repeat">
+      <a:schemeClr val="dk1"/>
+    </dgm:txFillClrLst>
+    <dgm:txEffectClrLst/>
+  </dgm:styleLbl>
+  <dgm:styleLbl name="fgAcc4">
+    <dgm:fillClrLst meth="repeat">
+      <a:schemeClr val="lt1">
+        <a:alpha val="90000"/>
+      </a:schemeClr>
+    </dgm:fillClrLst>
+    <dgm:linClrLst meth="repeat">
+      <a:schemeClr val="accent1"/>
+    </dgm:linClrLst>
+    <dgm:effectClrLst/>
+    <dgm:txLinClrLst/>
+    <dgm:txFillClrLst meth="repeat">
+      <a:schemeClr val="dk1"/>
+    </dgm:txFillClrLst>
+    <dgm:txEffectClrLst/>
+  </dgm:styleLbl>
+  <dgm:styleLbl name="bgShp">
+    <dgm:fillClrLst meth="repeat">
+      <a:schemeClr val="accent1">
+        <a:tint val="40000"/>
+      </a:schemeClr>
+    </dgm:fillClrLst>
+    <dgm:linClrLst meth="repeat">
+      <a:schemeClr val="accent1"/>
+    </dgm:linClrLst>
+    <dgm:effectClrLst/>
+    <dgm:txLinClrLst/>
+    <dgm:txFillClrLst meth="repeat">
+      <a:schemeClr val="dk1"/>
+    </dgm:txFillClrLst>
+    <dgm:txEffectClrLst/>
+  </dgm:styleLbl>
+  <dgm:styleLbl name="dkBgShp">
+    <dgm:fillClrLst meth="repeat">
+      <a:schemeClr val="accent1">
+        <a:shade val="80000"/>
+      </a:schemeClr>
+    </dgm:fillClrLst>
+    <dgm:linClrLst meth="repeat">
+      <a:schemeClr val="accent1"/>
+    </dgm:linClrLst>
+    <dgm:effectClrLst/>
+    <dgm:txLinClrLst/>
+    <dgm:txFillClrLst meth="repeat">
+      <a:schemeClr val="lt1"/>
+    </dgm:txFillClrLst>
+    <dgm:txEffectClrLst/>
+  </dgm:styleLbl>
+  <dgm:styleLbl name="trBgShp">
+    <dgm:fillClrLst meth="repeat">
+      <a:schemeClr val="accent1">
+        <a:tint val="50000"/>
+        <a:alpha val="40000"/>
+      </a:schemeClr>
+    </dgm:fillClrLst>
+    <dgm:linClrLst meth="repeat">
+      <a:schemeClr val="accent1"/>
+    </dgm:linClrLst>
+    <dgm:effectClrLst/>
+    <dgm:txLinClrLst/>
+    <dgm:txFillClrLst meth="repeat">
+      <a:schemeClr val="lt1"/>
+    </dgm:txFillClrLst>
+    <dgm:txEffectClrLst/>
+  </dgm:styleLbl>
+  <dgm:styleLbl name="fgShp">
+    <dgm:fillClrLst meth="repeat">
+      <a:schemeClr val="accent1">
+        <a:tint val="60000"/>
+      </a:schemeClr>
+    </dgm:fillClrLst>
+    <dgm:linClrLst meth="repeat">
+      <a:schemeClr val="lt1"/>
+    </dgm:linClrLst>
+    <dgm:effectClrLst/>
+    <dgm:txLinClrLst/>
+    <dgm:txFillClrLst meth="repeat">
+      <a:schemeClr val="dk1"/>
+    </dgm:txFillClrLst>
+    <dgm:txEffectClrLst/>
+  </dgm:styleLbl>
+  <dgm:styleLbl name="revTx">
+    <dgm:fillClrLst meth="repeat">
+      <a:schemeClr val="lt1">
+        <a:alpha val="0"/>
+      </a:schemeClr>
+    </dgm:fillClrLst>
+    <dgm:linClrLst meth="repeat">
+      <a:schemeClr val="dk1">
+        <a:alpha val="0"/>
+      </a:schemeClr>
+    </dgm:linClrLst>
+    <dgm:effectClrLst/>
+    <dgm:txLinClrLst/>
+    <dgm:txFillClrLst meth="repeat">
+      <a:schemeClr val="tx1"/>
+    </dgm:txFillClrLst>
+    <dgm:txEffectClrLst/>
+  </dgm:styleLbl>
+</dgm:colorsDef>
+</file>
+
 <file path=ppt/diagrams/data1.xml><?xml version="1.0" encoding="utf-8"?>
 <dgm:dataModel xmlns:dgm="http://schemas.openxmlformats.org/drawingml/2006/diagram" xmlns:a="http://schemas.openxmlformats.org/drawingml/2006/main">
   <dgm:ptLst>
@@ -5083,6 +5842,137 @@
     <dgm:cxn modelId="{51940E12-5377-4D53-BB8B-FC1EB6093EE6}" type="presParOf" srcId="{D3E76DC4-627F-4ECB-AC7A-DF86557FD602}" destId="{73F3B73A-45AD-4615-A413-051B2773216A}" srcOrd="0" destOrd="0" presId="urn:microsoft.com/office/officeart/2005/8/layout/hierarchy1"/>
     <dgm:cxn modelId="{288F3FDC-D011-4E61-8579-18934FD41E8D}" type="presParOf" srcId="{D3E76DC4-627F-4ECB-AC7A-DF86557FD602}" destId="{032AC25B-7898-4A7F-92FC-18DF4B9E28A6}" srcOrd="1" destOrd="0" presId="urn:microsoft.com/office/officeart/2005/8/layout/hierarchy1"/>
     <dgm:cxn modelId="{DF11A68F-D9C5-4565-8A00-196E290F9185}" type="presParOf" srcId="{110CC7A6-0069-4EBE-806B-B6595D055BA3}" destId="{FA3EC74A-C242-437E-8152-D83942D3FA26}" srcOrd="1" destOrd="0" presId="urn:microsoft.com/office/officeart/2005/8/layout/hierarchy1"/>
+  </dgm:cxnLst>
+  <dgm:bg/>
+  <dgm:whole/>
+  <dgm:extLst>
+    <a:ext uri="http://schemas.microsoft.com/office/drawing/2008/diagram">
+      <dsp:dataModelExt xmlns:dsp="http://schemas.microsoft.com/office/drawing/2008/diagram" relId="rId6" minVer="http://schemas.openxmlformats.org/drawingml/2006/diagram"/>
+    </a:ext>
+  </dgm:extLst>
+</dgm:dataModel>
+</file>
+
+<file path=ppt/diagrams/data3.xml><?xml version="1.0" encoding="utf-8"?>
+<dgm:dataModel xmlns:dgm="http://schemas.openxmlformats.org/drawingml/2006/diagram" xmlns:a="http://schemas.openxmlformats.org/drawingml/2006/main">
+  <dgm:ptLst>
+    <dgm:pt modelId="{951E068B-F3AA-4907-8942-A69A82F5A497}" type="doc">
+      <dgm:prSet loTypeId="urn:microsoft.com/office/officeart/2005/8/layout/arrow5" loCatId="relationship" qsTypeId="urn:microsoft.com/office/officeart/2005/8/quickstyle/simple1" qsCatId="simple" csTypeId="urn:microsoft.com/office/officeart/2005/8/colors/accent1_2" csCatId="accent1" phldr="1"/>
+      <dgm:spPr/>
+      <dgm:t>
+        <a:bodyPr/>
+        <a:lstStyle/>
+        <a:p>
+          <a:endParaRPr lang="en-US"/>
+        </a:p>
+      </dgm:t>
+    </dgm:pt>
+    <dgm:pt modelId="{29E94DCE-E350-4479-AAAB-353CDD2B3A30}">
+      <dgm:prSet phldrT="[Text]" phldr="0"/>
+      <dgm:spPr/>
+      <dgm:t>
+        <a:bodyPr/>
+        <a:lstStyle/>
+        <a:p>
+          <a:r>
+            <a:rPr lang="en-US" dirty="0"/>
+            <a:t>159 Missing in New File</a:t>
+          </a:r>
+        </a:p>
+      </dgm:t>
+    </dgm:pt>
+    <dgm:pt modelId="{69156A9C-FAF7-4DD3-AA8A-3A8D474A8C4A}" type="parTrans" cxnId="{5E6829BC-4546-48FA-AC82-F0F76A01F488}">
+      <dgm:prSet/>
+      <dgm:spPr/>
+      <dgm:t>
+        <a:bodyPr/>
+        <a:lstStyle/>
+        <a:p>
+          <a:endParaRPr lang="en-US"/>
+        </a:p>
+      </dgm:t>
+    </dgm:pt>
+    <dgm:pt modelId="{FF2DFAC0-C5D6-4068-A372-A7C58BC0091A}" type="sibTrans" cxnId="{5E6829BC-4546-48FA-AC82-F0F76A01F488}">
+      <dgm:prSet/>
+      <dgm:spPr/>
+      <dgm:t>
+        <a:bodyPr/>
+        <a:lstStyle/>
+        <a:p>
+          <a:endParaRPr lang="en-US"/>
+        </a:p>
+      </dgm:t>
+    </dgm:pt>
+    <dgm:pt modelId="{AF094EF6-8633-456E-99D7-9B703F61D54B}">
+      <dgm:prSet phldrT="[Text]" phldr="0"/>
+      <dgm:spPr/>
+      <dgm:t>
+        <a:bodyPr/>
+        <a:lstStyle/>
+        <a:p>
+          <a:r>
+            <a:rPr lang="en-US" dirty="0"/>
+            <a:t>159 Missing in Original file</a:t>
+          </a:r>
+        </a:p>
+      </dgm:t>
+    </dgm:pt>
+    <dgm:pt modelId="{6BA52176-F306-4B12-A77A-66AE2163E981}" type="parTrans" cxnId="{2063CE93-610E-499A-A318-E11802380DF6}">
+      <dgm:prSet/>
+      <dgm:spPr/>
+      <dgm:t>
+        <a:bodyPr/>
+        <a:lstStyle/>
+        <a:p>
+          <a:endParaRPr lang="en-US"/>
+        </a:p>
+      </dgm:t>
+    </dgm:pt>
+    <dgm:pt modelId="{5F31A5E3-E719-47E9-A82A-AE19C8C385AF}" type="sibTrans" cxnId="{2063CE93-610E-499A-A318-E11802380DF6}">
+      <dgm:prSet/>
+      <dgm:spPr/>
+      <dgm:t>
+        <a:bodyPr/>
+        <a:lstStyle/>
+        <a:p>
+          <a:endParaRPr lang="en-US"/>
+        </a:p>
+      </dgm:t>
+    </dgm:pt>
+    <dgm:pt modelId="{4053D8D8-082D-4FF8-8253-DBE74E752B58}" type="pres">
+      <dgm:prSet presAssocID="{951E068B-F3AA-4907-8942-A69A82F5A497}" presName="diagram" presStyleCnt="0">
+        <dgm:presLayoutVars>
+          <dgm:dir/>
+          <dgm:resizeHandles val="exact"/>
+        </dgm:presLayoutVars>
+      </dgm:prSet>
+      <dgm:spPr/>
+    </dgm:pt>
+    <dgm:pt modelId="{FD91C2ED-252C-4124-BBDB-F1BE4F7B8688}" type="pres">
+      <dgm:prSet presAssocID="{29E94DCE-E350-4479-AAAB-353CDD2B3A30}" presName="arrow" presStyleLbl="node1" presStyleIdx="0" presStyleCnt="2">
+        <dgm:presLayoutVars>
+          <dgm:bulletEnabled val="1"/>
+        </dgm:presLayoutVars>
+      </dgm:prSet>
+      <dgm:spPr/>
+    </dgm:pt>
+    <dgm:pt modelId="{FCC8B91E-1D3A-49C0-A6A0-7FAB1042BB49}" type="pres">
+      <dgm:prSet presAssocID="{AF094EF6-8633-456E-99D7-9B703F61D54B}" presName="arrow" presStyleLbl="node1" presStyleIdx="1" presStyleCnt="2">
+        <dgm:presLayoutVars>
+          <dgm:bulletEnabled val="1"/>
+        </dgm:presLayoutVars>
+      </dgm:prSet>
+      <dgm:spPr/>
+    </dgm:pt>
+  </dgm:ptLst>
+  <dgm:cxnLst>
+    <dgm:cxn modelId="{CB86FA02-BA20-461E-A0C3-125AC4989893}" type="presOf" srcId="{AF094EF6-8633-456E-99D7-9B703F61D54B}" destId="{FCC8B91E-1D3A-49C0-A6A0-7FAB1042BB49}" srcOrd="0" destOrd="0" presId="urn:microsoft.com/office/officeart/2005/8/layout/arrow5"/>
+    <dgm:cxn modelId="{93D7CA4C-11C2-47CA-86F0-F1A04E9712B8}" type="presOf" srcId="{951E068B-F3AA-4907-8942-A69A82F5A497}" destId="{4053D8D8-082D-4FF8-8253-DBE74E752B58}" srcOrd="0" destOrd="0" presId="urn:microsoft.com/office/officeart/2005/8/layout/arrow5"/>
+    <dgm:cxn modelId="{94F35193-316E-4B4D-AB63-E45A37A0B5A9}" type="presOf" srcId="{29E94DCE-E350-4479-AAAB-353CDD2B3A30}" destId="{FD91C2ED-252C-4124-BBDB-F1BE4F7B8688}" srcOrd="0" destOrd="0" presId="urn:microsoft.com/office/officeart/2005/8/layout/arrow5"/>
+    <dgm:cxn modelId="{2063CE93-610E-499A-A318-E11802380DF6}" srcId="{951E068B-F3AA-4907-8942-A69A82F5A497}" destId="{AF094EF6-8633-456E-99D7-9B703F61D54B}" srcOrd="1" destOrd="0" parTransId="{6BA52176-F306-4B12-A77A-66AE2163E981}" sibTransId="{5F31A5E3-E719-47E9-A82A-AE19C8C385AF}"/>
+    <dgm:cxn modelId="{5E6829BC-4546-48FA-AC82-F0F76A01F488}" srcId="{951E068B-F3AA-4907-8942-A69A82F5A497}" destId="{29E94DCE-E350-4479-AAAB-353CDD2B3A30}" srcOrd="0" destOrd="0" parTransId="{69156A9C-FAF7-4DD3-AA8A-3A8D474A8C4A}" sibTransId="{FF2DFAC0-C5D6-4068-A372-A7C58BC0091A}"/>
+    <dgm:cxn modelId="{DB71CE0E-4AE4-4F3C-AC72-562CA5A8596D}" type="presParOf" srcId="{4053D8D8-082D-4FF8-8253-DBE74E752B58}" destId="{FD91C2ED-252C-4124-BBDB-F1BE4F7B8688}" srcOrd="0" destOrd="0" presId="urn:microsoft.com/office/officeart/2005/8/layout/arrow5"/>
+    <dgm:cxn modelId="{EA25B764-ACA3-4C0D-8CBF-0BDDCF301E0C}" type="presParOf" srcId="{4053D8D8-082D-4FF8-8253-DBE74E752B58}" destId="{FCC8B91E-1D3A-49C0-A6A0-7FAB1042BB49}" srcOrd="1" destOrd="0" presId="urn:microsoft.com/office/officeart/2005/8/layout/arrow5"/>
   </dgm:cxnLst>
   <dgm:bg/>
   <dgm:whole/>
@@ -6082,6 +6972,180 @@
 </dsp:drawing>
 </file>
 
+<file path=ppt/diagrams/drawing3.xml><?xml version="1.0" encoding="utf-8"?>
+<dsp:drawing xmlns:dgm="http://schemas.openxmlformats.org/drawingml/2006/diagram" xmlns:dsp="http://schemas.microsoft.com/office/drawing/2008/diagram" xmlns:a="http://schemas.openxmlformats.org/drawingml/2006/main">
+  <dsp:spTree>
+    <dsp:nvGrpSpPr>
+      <dsp:cNvPr id="0" name=""/>
+      <dsp:cNvGrpSpPr/>
+    </dsp:nvGrpSpPr>
+    <dsp:grpSpPr/>
+    <dsp:sp modelId="{FD91C2ED-252C-4124-BBDB-F1BE4F7B8688}">
+      <dsp:nvSpPr>
+        <dsp:cNvPr id="0" name=""/>
+        <dsp:cNvSpPr/>
+      </dsp:nvSpPr>
+      <dsp:spPr>
+        <a:xfrm rot="16200000">
+          <a:off x="2338" y="1178"/>
+          <a:ext cx="4348981" cy="4348981"/>
+        </a:xfrm>
+        <a:prstGeom prst="downArrow">
+          <a:avLst>
+            <a:gd name="adj1" fmla="val 50000"/>
+            <a:gd name="adj2" fmla="val 35000"/>
+          </a:avLst>
+        </a:prstGeom>
+        <a:solidFill>
+          <a:schemeClr val="accent1">
+            <a:hueOff val="0"/>
+            <a:satOff val="0"/>
+            <a:lumOff val="0"/>
+            <a:alphaOff val="0"/>
+          </a:schemeClr>
+        </a:solidFill>
+        <a:ln w="19050" cap="flat" cmpd="sng" algn="ctr">
+          <a:solidFill>
+            <a:schemeClr val="lt1">
+              <a:hueOff val="0"/>
+              <a:satOff val="0"/>
+              <a:lumOff val="0"/>
+              <a:alphaOff val="0"/>
+            </a:schemeClr>
+          </a:solidFill>
+          <a:prstDash val="solid"/>
+          <a:miter lim="800000"/>
+        </a:ln>
+        <a:effectLst/>
+      </dsp:spPr>
+      <dsp:style>
+        <a:lnRef idx="2">
+          <a:scrgbClr r="0" g="0" b="0"/>
+        </a:lnRef>
+        <a:fillRef idx="1">
+          <a:scrgbClr r="0" g="0" b="0"/>
+        </a:fillRef>
+        <a:effectRef idx="0">
+          <a:scrgbClr r="0" g="0" b="0"/>
+        </a:effectRef>
+        <a:fontRef idx="minor">
+          <a:schemeClr val="lt1"/>
+        </a:fontRef>
+      </dsp:style>
+      <dsp:txBody>
+        <a:bodyPr spcFirstLastPara="0" vert="horz" wrap="square" lIns="284480" tIns="284480" rIns="284480" bIns="284480" numCol="1" spcCol="1270" anchor="ctr" anchorCtr="0">
+          <a:noAutofit/>
+        </a:bodyPr>
+        <a:lstStyle/>
+        <a:p>
+          <a:pPr marL="0" lvl="0" indent="0" algn="ctr" defTabSz="1778000">
+            <a:lnSpc>
+              <a:spcPct val="90000"/>
+            </a:lnSpc>
+            <a:spcBef>
+              <a:spcPct val="0"/>
+            </a:spcBef>
+            <a:spcAft>
+              <a:spcPct val="35000"/>
+            </a:spcAft>
+            <a:buNone/>
+          </a:pPr>
+          <a:r>
+            <a:rPr lang="en-US" sz="4000" kern="1200" dirty="0"/>
+            <a:t>159 Missing in New File</a:t>
+          </a:r>
+        </a:p>
+      </dsp:txBody>
+      <dsp:txXfrm rot="5400000">
+        <a:off x="2338" y="1088423"/>
+        <a:ext cx="3587909" cy="2174491"/>
+      </dsp:txXfrm>
+    </dsp:sp>
+    <dsp:sp modelId="{FCC8B91E-1D3A-49C0-A6A0-7FAB1042BB49}">
+      <dsp:nvSpPr>
+        <dsp:cNvPr id="0" name=""/>
+        <dsp:cNvSpPr/>
+      </dsp:nvSpPr>
+      <dsp:spPr>
+        <a:xfrm rot="5400000">
+          <a:off x="6164280" y="1178"/>
+          <a:ext cx="4348981" cy="4348981"/>
+        </a:xfrm>
+        <a:prstGeom prst="downArrow">
+          <a:avLst>
+            <a:gd name="adj1" fmla="val 50000"/>
+            <a:gd name="adj2" fmla="val 35000"/>
+          </a:avLst>
+        </a:prstGeom>
+        <a:solidFill>
+          <a:schemeClr val="accent1">
+            <a:hueOff val="0"/>
+            <a:satOff val="0"/>
+            <a:lumOff val="0"/>
+            <a:alphaOff val="0"/>
+          </a:schemeClr>
+        </a:solidFill>
+        <a:ln w="19050" cap="flat" cmpd="sng" algn="ctr">
+          <a:solidFill>
+            <a:schemeClr val="lt1">
+              <a:hueOff val="0"/>
+              <a:satOff val="0"/>
+              <a:lumOff val="0"/>
+              <a:alphaOff val="0"/>
+            </a:schemeClr>
+          </a:solidFill>
+          <a:prstDash val="solid"/>
+          <a:miter lim="800000"/>
+        </a:ln>
+        <a:effectLst/>
+      </dsp:spPr>
+      <dsp:style>
+        <a:lnRef idx="2">
+          <a:scrgbClr r="0" g="0" b="0"/>
+        </a:lnRef>
+        <a:fillRef idx="1">
+          <a:scrgbClr r="0" g="0" b="0"/>
+        </a:fillRef>
+        <a:effectRef idx="0">
+          <a:scrgbClr r="0" g="0" b="0"/>
+        </a:effectRef>
+        <a:fontRef idx="minor">
+          <a:schemeClr val="lt1"/>
+        </a:fontRef>
+      </dsp:style>
+      <dsp:txBody>
+        <a:bodyPr spcFirstLastPara="0" vert="horz" wrap="square" lIns="284480" tIns="284480" rIns="284480" bIns="284480" numCol="1" spcCol="1270" anchor="ctr" anchorCtr="0">
+          <a:noAutofit/>
+        </a:bodyPr>
+        <a:lstStyle/>
+        <a:p>
+          <a:pPr marL="0" lvl="0" indent="0" algn="ctr" defTabSz="1778000">
+            <a:lnSpc>
+              <a:spcPct val="90000"/>
+            </a:lnSpc>
+            <a:spcBef>
+              <a:spcPct val="0"/>
+            </a:spcBef>
+            <a:spcAft>
+              <a:spcPct val="35000"/>
+            </a:spcAft>
+            <a:buNone/>
+          </a:pPr>
+          <a:r>
+            <a:rPr lang="en-US" sz="4000" kern="1200" dirty="0"/>
+            <a:t>159 Missing in Original file</a:t>
+          </a:r>
+        </a:p>
+      </dsp:txBody>
+      <dsp:txXfrm rot="-5400000">
+        <a:off x="6925352" y="1088423"/>
+        <a:ext cx="3587909" cy="2174491"/>
+      </dsp:txXfrm>
+    </dsp:sp>
+  </dsp:spTree>
+</dsp:drawing>
+</file>
+
 <file path=ppt/diagrams/layout1.xml><?xml version="1.0" encoding="utf-8"?>
 <dgm:layoutDef xmlns:dgm="http://schemas.openxmlformats.org/drawingml/2006/diagram" xmlns:a="http://schemas.openxmlformats.org/drawingml/2006/main" uniqueId="urn:microsoft.com/office/officeart/2005/8/layout/pyramid1">
   <dgm:title val=""/>
@@ -6877,6 +7941,198 @@
 </dgm:layoutDef>
 </file>
 
+<file path=ppt/diagrams/layout3.xml><?xml version="1.0" encoding="utf-8"?>
+<dgm:layoutDef xmlns:dgm="http://schemas.openxmlformats.org/drawingml/2006/diagram" xmlns:a="http://schemas.openxmlformats.org/drawingml/2006/main" uniqueId="urn:microsoft.com/office/officeart/2005/8/layout/arrow5">
+  <dgm:title val=""/>
+  <dgm:desc val=""/>
+  <dgm:catLst>
+    <dgm:cat type="relationship" pri="6000"/>
+    <dgm:cat type="process" pri="31000"/>
+  </dgm:catLst>
+  <dgm:sampData>
+    <dgm:dataModel>
+      <dgm:ptLst>
+        <dgm:pt modelId="0" type="doc"/>
+        <dgm:pt modelId="1">
+          <dgm:prSet phldr="1"/>
+        </dgm:pt>
+        <dgm:pt modelId="2">
+          <dgm:prSet phldr="1"/>
+        </dgm:pt>
+      </dgm:ptLst>
+      <dgm:cxnLst>
+        <dgm:cxn modelId="4" srcId="0" destId="1" srcOrd="0" destOrd="0"/>
+        <dgm:cxn modelId="5" srcId="0" destId="2" srcOrd="1" destOrd="0"/>
+      </dgm:cxnLst>
+      <dgm:bg/>
+      <dgm:whole/>
+    </dgm:dataModel>
+  </dgm:sampData>
+  <dgm:styleData>
+    <dgm:dataModel>
+      <dgm:ptLst>
+        <dgm:pt modelId="0" type="doc"/>
+        <dgm:pt modelId="1"/>
+        <dgm:pt modelId="2"/>
+      </dgm:ptLst>
+      <dgm:cxnLst>
+        <dgm:cxn modelId="3" srcId="0" destId="1" srcOrd="0" destOrd="0"/>
+        <dgm:cxn modelId="4" srcId="0" destId="2" srcOrd="1" destOrd="0"/>
+      </dgm:cxnLst>
+      <dgm:bg/>
+      <dgm:whole/>
+    </dgm:dataModel>
+  </dgm:styleData>
+  <dgm:clrData>
+    <dgm:dataModel>
+      <dgm:ptLst>
+        <dgm:pt modelId="0" type="doc"/>
+        <dgm:pt modelId="1"/>
+        <dgm:pt modelId="2"/>
+        <dgm:pt modelId="3"/>
+        <dgm:pt modelId="4"/>
+      </dgm:ptLst>
+      <dgm:cxnLst>
+        <dgm:cxn modelId="5" srcId="0" destId="1" srcOrd="0" destOrd="0"/>
+        <dgm:cxn modelId="6" srcId="0" destId="2" srcOrd="1" destOrd="0"/>
+        <dgm:cxn modelId="7" srcId="0" destId="3" srcOrd="2" destOrd="0"/>
+        <dgm:cxn modelId="8" srcId="0" destId="4" srcOrd="3" destOrd="0"/>
+      </dgm:cxnLst>
+      <dgm:bg/>
+      <dgm:whole/>
+    </dgm:dataModel>
+  </dgm:clrData>
+  <dgm:layoutNode name="diagram">
+    <dgm:varLst>
+      <dgm:dir/>
+      <dgm:resizeHandles val="exact"/>
+    </dgm:varLst>
+    <dgm:choose name="Name0">
+      <dgm:if name="Name1" axis="ch" ptType="node" func="cnt" op="equ" val="2">
+        <dgm:choose name="Name2">
+          <dgm:if name="Name3" func="var" arg="dir" op="equ" val="norm">
+            <dgm:alg type="cycle">
+              <dgm:param type="rotPath" val="alongPath"/>
+              <dgm:param type="stAng" val="270"/>
+            </dgm:alg>
+          </dgm:if>
+          <dgm:else name="Name4">
+            <dgm:alg type="cycle">
+              <dgm:param type="rotPath" val="alongPath"/>
+              <dgm:param type="stAng" val="90"/>
+              <dgm:param type="spanAng" val="-360"/>
+            </dgm:alg>
+          </dgm:else>
+        </dgm:choose>
+      </dgm:if>
+      <dgm:else name="Name5">
+        <dgm:choose name="Name6">
+          <dgm:if name="Name7" func="var" arg="dir" op="equ" val="norm">
+            <dgm:alg type="cycle">
+              <dgm:param type="rotPath" val="alongPath"/>
+            </dgm:alg>
+          </dgm:if>
+          <dgm:else name="Name8">
+            <dgm:alg type="cycle">
+              <dgm:param type="rotPath" val="alongPath"/>
+              <dgm:param type="spanAng" val="-360"/>
+            </dgm:alg>
+          </dgm:else>
+        </dgm:choose>
+      </dgm:else>
+    </dgm:choose>
+    <dgm:shape xmlns:r="http://schemas.openxmlformats.org/officeDocument/2006/relationships" r:blip="">
+      <dgm:adjLst/>
+    </dgm:shape>
+    <dgm:presOf/>
+    <dgm:choose name="Name9">
+      <dgm:if name="Name10" axis="ch" ptType="node" func="cnt" op="lte" val="2">
+        <dgm:constrLst>
+          <dgm:constr type="primFontSz" for="ch" ptType="node" op="equ" val="65"/>
+          <dgm:constr type="w" for="ch" ptType="node" refType="w"/>
+          <dgm:constr type="h" for="ch" ptType="node" refType="w" refFor="ch" refPtType="node" op="equ"/>
+          <dgm:constr type="sibSp" refType="w" refFor="ch" refPtType="node" fact="0.1"/>
+          <dgm:constr type="sibSp" refType="h" op="lte" fact="0.1"/>
+          <dgm:constr type="diam" refType="w" refFor="ch" refPtType="node" op="equ" fact="1.1"/>
+        </dgm:constrLst>
+      </dgm:if>
+      <dgm:if name="Name11" axis="ch" ptType="node" func="cnt" op="equ" val="5">
+        <dgm:constrLst>
+          <dgm:constr type="primFontSz" for="ch" ptType="node" op="equ" val="65"/>
+          <dgm:constr type="w" for="ch" ptType="node" refType="w"/>
+          <dgm:constr type="h" for="ch" ptType="node" refType="w" refFor="ch" refPtType="node" op="equ"/>
+          <dgm:constr type="sibSp" refType="w" refFor="ch" refPtType="node" fact="-0.2"/>
+          <dgm:constr type="sibSp" refType="h" op="lte" fact="0.1"/>
+        </dgm:constrLst>
+      </dgm:if>
+      <dgm:if name="Name12" axis="ch" ptType="node" func="cnt" op="equ" val="6">
+        <dgm:constrLst>
+          <dgm:constr type="primFontSz" for="ch" ptType="node" op="equ" val="65"/>
+          <dgm:constr type="w" for="ch" ptType="node" refType="w"/>
+          <dgm:constr type="h" for="ch" ptType="node" refType="w" refFor="ch" refPtType="node" op="equ"/>
+          <dgm:constr type="sibSp" refType="w" refFor="ch" refPtType="node" fact="-0.1"/>
+          <dgm:constr type="sibSp" refType="h" op="lte" fact="0.1"/>
+        </dgm:constrLst>
+      </dgm:if>
+      <dgm:if name="Name13" axis="ch" ptType="node" func="cnt" op="equ" val="7">
+        <dgm:constrLst>
+          <dgm:constr type="primFontSz" for="ch" ptType="node" op="equ" val="65"/>
+          <dgm:constr type="w" for="ch" ptType="node" refType="w"/>
+          <dgm:constr type="h" for="ch" ptType="node" refType="w" refFor="ch" refPtType="node" op="equ"/>
+          <dgm:constr type="sibSp" refType="w" refFor="ch" refPtType="node" fact="-0.1"/>
+          <dgm:constr type="sibSp" refType="h" op="lte" fact="0.1"/>
+        </dgm:constrLst>
+      </dgm:if>
+      <dgm:if name="Name14" axis="ch" ptType="node" func="cnt" op="equ" val="8">
+        <dgm:constrLst>
+          <dgm:constr type="primFontSz" for="ch" ptType="node" op="equ" val="65"/>
+          <dgm:constr type="w" for="ch" ptType="node" refType="w"/>
+          <dgm:constr type="h" for="ch" ptType="node" refType="w" refFor="ch" refPtType="node" op="equ"/>
+          <dgm:constr type="sibSp"/>
+          <dgm:constr type="sibSp" refType="h" op="lte" fact="0.1"/>
+        </dgm:constrLst>
+      </dgm:if>
+      <dgm:if name="Name15" axis="ch" ptType="node" func="cnt" op="gte" val="9">
+        <dgm:constrLst>
+          <dgm:constr type="primFontSz" for="ch" ptType="node" op="equ" val="65"/>
+          <dgm:constr type="w" for="ch" ptType="node" refType="w"/>
+          <dgm:constr type="h" for="ch" ptType="node" refType="w" refFor="ch" refPtType="node" op="equ"/>
+          <dgm:constr type="sibSp" refType="w" refFor="ch" refPtType="node" fact="-0.1"/>
+          <dgm:constr type="sibSp" refType="h" op="lte" fact="0.1"/>
+        </dgm:constrLst>
+      </dgm:if>
+      <dgm:else name="Name16">
+        <dgm:constrLst>
+          <dgm:constr type="primFontSz" for="ch" ptType="node" op="equ" val="65"/>
+          <dgm:constr type="w" for="ch" ptType="node" refType="w"/>
+          <dgm:constr type="h" for="ch" ptType="node" refType="w" refFor="ch" refPtType="node" op="equ"/>
+          <dgm:constr type="sibSp" refType="w" refFor="ch" refPtType="node" fact="-0.35"/>
+        </dgm:constrLst>
+      </dgm:else>
+    </dgm:choose>
+    <dgm:ruleLst/>
+    <dgm:forEach name="Name17" axis="ch" ptType="node">
+      <dgm:layoutNode name="arrow">
+        <dgm:varLst>
+          <dgm:bulletEnabled val="1"/>
+        </dgm:varLst>
+        <dgm:alg type="tx"/>
+        <dgm:shape xmlns:r="http://schemas.openxmlformats.org/officeDocument/2006/relationships" type="downArrow" r:blip="">
+          <dgm:adjLst>
+            <dgm:adj idx="2" val="0.35"/>
+          </dgm:adjLst>
+        </dgm:shape>
+        <dgm:presOf axis="desOrSelf" ptType="node"/>
+        <dgm:constrLst/>
+        <dgm:ruleLst>
+          <dgm:rule type="primFontSz" val="5" fact="NaN" max="NaN"/>
+        </dgm:ruleLst>
+      </dgm:layoutNode>
+    </dgm:forEach>
+  </dgm:layoutNode>
+</dgm:layoutDef>
+</file>
+
 <file path=ppt/diagrams/quickStyle1.xml><?xml version="1.0" encoding="utf-8"?>
 <dgm:styleDef xmlns:dgm="http://schemas.openxmlformats.org/drawingml/2006/diagram" xmlns:a="http://schemas.openxmlformats.org/drawingml/2006/main" uniqueId="urn:microsoft.com/office/officeart/2005/8/quickstyle/simple1">
   <dgm:title val=""/>
@@ -7912,6 +9168,1040 @@
 </file>
 
 <file path=ppt/diagrams/quickStyle2.xml><?xml version="1.0" encoding="utf-8"?>
+<dgm:styleDef xmlns:dgm="http://schemas.openxmlformats.org/drawingml/2006/diagram" xmlns:a="http://schemas.openxmlformats.org/drawingml/2006/main" uniqueId="urn:microsoft.com/office/officeart/2005/8/quickstyle/simple1">
+  <dgm:title val=""/>
+  <dgm:desc val=""/>
+  <dgm:catLst>
+    <dgm:cat type="simple" pri="10100"/>
+  </dgm:catLst>
+  <dgm:scene3d>
+    <a:camera prst="orthographicFront"/>
+    <a:lightRig rig="threePt" dir="t"/>
+  </dgm:scene3d>
+  <dgm:styleLbl name="node0">
+    <dgm:scene3d>
+      <a:camera prst="orthographicFront"/>
+      <a:lightRig rig="threePt" dir="t"/>
+    </dgm:scene3d>
+    <dgm:sp3d/>
+    <dgm:txPr/>
+    <dgm:style>
+      <a:lnRef idx="2">
+        <a:scrgbClr r="0" g="0" b="0"/>
+      </a:lnRef>
+      <a:fillRef idx="1">
+        <a:scrgbClr r="0" g="0" b="0"/>
+      </a:fillRef>
+      <a:effectRef idx="0">
+        <a:scrgbClr r="0" g="0" b="0"/>
+      </a:effectRef>
+      <a:fontRef idx="minor">
+        <a:schemeClr val="lt1"/>
+      </a:fontRef>
+    </dgm:style>
+  </dgm:styleLbl>
+  <dgm:styleLbl name="lnNode1">
+    <dgm:scene3d>
+      <a:camera prst="orthographicFront"/>
+      <a:lightRig rig="threePt" dir="t"/>
+    </dgm:scene3d>
+    <dgm:sp3d/>
+    <dgm:txPr/>
+    <dgm:style>
+      <a:lnRef idx="2">
+        <a:scrgbClr r="0" g="0" b="0"/>
+      </a:lnRef>
+      <a:fillRef idx="1">
+        <a:scrgbClr r="0" g="0" b="0"/>
+      </a:fillRef>
+      <a:effectRef idx="0">
+        <a:scrgbClr r="0" g="0" b="0"/>
+      </a:effectRef>
+      <a:fontRef idx="minor">
+        <a:schemeClr val="lt1"/>
+      </a:fontRef>
+    </dgm:style>
+  </dgm:styleLbl>
+  <dgm:styleLbl name="vennNode1">
+    <dgm:scene3d>
+      <a:camera prst="orthographicFront"/>
+      <a:lightRig rig="threePt" dir="t"/>
+    </dgm:scene3d>
+    <dgm:sp3d/>
+    <dgm:txPr/>
+    <dgm:style>
+      <a:lnRef idx="2">
+        <a:scrgbClr r="0" g="0" b="0"/>
+      </a:lnRef>
+      <a:fillRef idx="1">
+        <a:scrgbClr r="0" g="0" b="0"/>
+      </a:fillRef>
+      <a:effectRef idx="0">
+        <a:scrgbClr r="0" g="0" b="0"/>
+      </a:effectRef>
+      <a:fontRef idx="minor">
+        <a:schemeClr val="tx1"/>
+      </a:fontRef>
+    </dgm:style>
+  </dgm:styleLbl>
+  <dgm:styleLbl name="alignNode1">
+    <dgm:scene3d>
+      <a:camera prst="orthographicFront"/>
+      <a:lightRig rig="threePt" dir="t"/>
+    </dgm:scene3d>
+    <dgm:sp3d/>
+    <dgm:txPr/>
+    <dgm:style>
+      <a:lnRef idx="2">
+        <a:scrgbClr r="0" g="0" b="0"/>
+      </a:lnRef>
+      <a:fillRef idx="1">
+        <a:scrgbClr r="0" g="0" b="0"/>
+      </a:fillRef>
+      <a:effectRef idx="0">
+        <a:scrgbClr r="0" g="0" b="0"/>
+      </a:effectRef>
+      <a:fontRef idx="minor">
+        <a:schemeClr val="lt1"/>
+      </a:fontRef>
+    </dgm:style>
+  </dgm:styleLbl>
+  <dgm:styleLbl name="node1">
+    <dgm:scene3d>
+      <a:camera prst="orthographicFront"/>
+      <a:lightRig rig="threePt" dir="t"/>
+    </dgm:scene3d>
+    <dgm:sp3d/>
+    <dgm:txPr/>
+    <dgm:style>
+      <a:lnRef idx="2">
+        <a:scrgbClr r="0" g="0" b="0"/>
+      </a:lnRef>
+      <a:fillRef idx="1">
+        <a:scrgbClr r="0" g="0" b="0"/>
+      </a:fillRef>
+      <a:effectRef idx="0">
+        <a:scrgbClr r="0" g="0" b="0"/>
+      </a:effectRef>
+      <a:fontRef idx="minor">
+        <a:schemeClr val="lt1"/>
+      </a:fontRef>
+    </dgm:style>
+  </dgm:styleLbl>
+  <dgm:styleLbl name="node2">
+    <dgm:scene3d>
+      <a:camera prst="orthographicFront"/>
+      <a:lightRig rig="threePt" dir="t"/>
+    </dgm:scene3d>
+    <dgm:sp3d/>
+    <dgm:txPr/>
+    <dgm:style>
+      <a:lnRef idx="2">
+        <a:scrgbClr r="0" g="0" b="0"/>
+      </a:lnRef>
+      <a:fillRef idx="1">
+        <a:scrgbClr r="0" g="0" b="0"/>
+      </a:fillRef>
+      <a:effectRef idx="0">
+        <a:scrgbClr r="0" g="0" b="0"/>
+      </a:effectRef>
+      <a:fontRef idx="minor">
+        <a:schemeClr val="lt1"/>
+      </a:fontRef>
+    </dgm:style>
+  </dgm:styleLbl>
+  <dgm:styleLbl name="node3">
+    <dgm:scene3d>
+      <a:camera prst="orthographicFront"/>
+      <a:lightRig rig="threePt" dir="t"/>
+    </dgm:scene3d>
+    <dgm:sp3d/>
+    <dgm:txPr/>
+    <dgm:style>
+      <a:lnRef idx="2">
+        <a:scrgbClr r="0" g="0" b="0"/>
+      </a:lnRef>
+      <a:fillRef idx="1">
+        <a:scrgbClr r="0" g="0" b="0"/>
+      </a:fillRef>
+      <a:effectRef idx="0">
+        <a:scrgbClr r="0" g="0" b="0"/>
+      </a:effectRef>
+      <a:fontRef idx="minor">
+        <a:schemeClr val="lt1"/>
+      </a:fontRef>
+    </dgm:style>
+  </dgm:styleLbl>
+  <dgm:styleLbl name="node4">
+    <dgm:scene3d>
+      <a:camera prst="orthographicFront"/>
+      <a:lightRig rig="threePt" dir="t"/>
+    </dgm:scene3d>
+    <dgm:sp3d/>
+    <dgm:txPr/>
+    <dgm:style>
+      <a:lnRef idx="2">
+        <a:scrgbClr r="0" g="0" b="0"/>
+      </a:lnRef>
+      <a:fillRef idx="1">
+        <a:scrgbClr r="0" g="0" b="0"/>
+      </a:fillRef>
+      <a:effectRef idx="0">
+        <a:scrgbClr r="0" g="0" b="0"/>
+      </a:effectRef>
+      <a:fontRef idx="minor">
+        <a:schemeClr val="lt1"/>
+      </a:fontRef>
+    </dgm:style>
+  </dgm:styleLbl>
+  <dgm:styleLbl name="fgImgPlace1">
+    <dgm:scene3d>
+      <a:camera prst="orthographicFront"/>
+      <a:lightRig rig="threePt" dir="t"/>
+    </dgm:scene3d>
+    <dgm:sp3d/>
+    <dgm:txPr/>
+    <dgm:style>
+      <a:lnRef idx="2">
+        <a:scrgbClr r="0" g="0" b="0"/>
+      </a:lnRef>
+      <a:fillRef idx="1">
+        <a:scrgbClr r="0" g="0" b="0"/>
+      </a:fillRef>
+      <a:effectRef idx="0">
+        <a:scrgbClr r="0" g="0" b="0"/>
+      </a:effectRef>
+      <a:fontRef idx="minor"/>
+    </dgm:style>
+  </dgm:styleLbl>
+  <dgm:styleLbl name="alignImgPlace1">
+    <dgm:scene3d>
+      <a:camera prst="orthographicFront"/>
+      <a:lightRig rig="threePt" dir="t"/>
+    </dgm:scene3d>
+    <dgm:sp3d/>
+    <dgm:txPr/>
+    <dgm:style>
+      <a:lnRef idx="2">
+        <a:scrgbClr r="0" g="0" b="0"/>
+      </a:lnRef>
+      <a:fillRef idx="1">
+        <a:scrgbClr r="0" g="0" b="0"/>
+      </a:fillRef>
+      <a:effectRef idx="0">
+        <a:scrgbClr r="0" g="0" b="0"/>
+      </a:effectRef>
+      <a:fontRef idx="minor"/>
+    </dgm:style>
+  </dgm:styleLbl>
+  <dgm:styleLbl name="bgImgPlace1">
+    <dgm:scene3d>
+      <a:camera prst="orthographicFront"/>
+      <a:lightRig rig="threePt" dir="t"/>
+    </dgm:scene3d>
+    <dgm:sp3d/>
+    <dgm:txPr/>
+    <dgm:style>
+      <a:lnRef idx="2">
+        <a:scrgbClr r="0" g="0" b="0"/>
+      </a:lnRef>
+      <a:fillRef idx="1">
+        <a:scrgbClr r="0" g="0" b="0"/>
+      </a:fillRef>
+      <a:effectRef idx="0">
+        <a:scrgbClr r="0" g="0" b="0"/>
+      </a:effectRef>
+      <a:fontRef idx="minor"/>
+    </dgm:style>
+  </dgm:styleLbl>
+  <dgm:styleLbl name="sibTrans2D1">
+    <dgm:scene3d>
+      <a:camera prst="orthographicFront"/>
+      <a:lightRig rig="threePt" dir="t"/>
+    </dgm:scene3d>
+    <dgm:sp3d/>
+    <dgm:txPr/>
+    <dgm:style>
+      <a:lnRef idx="0">
+        <a:scrgbClr r="0" g="0" b="0"/>
+      </a:lnRef>
+      <a:fillRef idx="1">
+        <a:scrgbClr r="0" g="0" b="0"/>
+      </a:fillRef>
+      <a:effectRef idx="0">
+        <a:scrgbClr r="0" g="0" b="0"/>
+      </a:effectRef>
+      <a:fontRef idx="minor">
+        <a:schemeClr val="lt1"/>
+      </a:fontRef>
+    </dgm:style>
+  </dgm:styleLbl>
+  <dgm:styleLbl name="fgSibTrans2D1">
+    <dgm:scene3d>
+      <a:camera prst="orthographicFront"/>
+      <a:lightRig rig="threePt" dir="t"/>
+    </dgm:scene3d>
+    <dgm:sp3d/>
+    <dgm:txPr/>
+    <dgm:style>
+      <a:lnRef idx="0">
+        <a:scrgbClr r="0" g="0" b="0"/>
+      </a:lnRef>
+      <a:fillRef idx="1">
+        <a:scrgbClr r="0" g="0" b="0"/>
+      </a:fillRef>
+      <a:effectRef idx="0">
+        <a:scrgbClr r="0" g="0" b="0"/>
+      </a:effectRef>
+      <a:fontRef idx="minor">
+        <a:schemeClr val="lt1"/>
+      </a:fontRef>
+    </dgm:style>
+  </dgm:styleLbl>
+  <dgm:styleLbl name="bgSibTrans2D1">
+    <dgm:scene3d>
+      <a:camera prst="orthographicFront"/>
+      <a:lightRig rig="threePt" dir="t"/>
+    </dgm:scene3d>
+    <dgm:sp3d/>
+    <dgm:txPr/>
+    <dgm:style>
+      <a:lnRef idx="0">
+        <a:scrgbClr r="0" g="0" b="0"/>
+      </a:lnRef>
+      <a:fillRef idx="1">
+        <a:scrgbClr r="0" g="0" b="0"/>
+      </a:fillRef>
+      <a:effectRef idx="0">
+        <a:scrgbClr r="0" g="0" b="0"/>
+      </a:effectRef>
+      <a:fontRef idx="minor">
+        <a:schemeClr val="lt1"/>
+      </a:fontRef>
+    </dgm:style>
+  </dgm:styleLbl>
+  <dgm:styleLbl name="sibTrans1D1">
+    <dgm:scene3d>
+      <a:camera prst="orthographicFront"/>
+      <a:lightRig rig="threePt" dir="t"/>
+    </dgm:scene3d>
+    <dgm:sp3d/>
+    <dgm:txPr/>
+    <dgm:style>
+      <a:lnRef idx="1">
+        <a:scrgbClr r="0" g="0" b="0"/>
+      </a:lnRef>
+      <a:fillRef idx="0">
+        <a:scrgbClr r="0" g="0" b="0"/>
+      </a:fillRef>
+      <a:effectRef idx="0">
+        <a:scrgbClr r="0" g="0" b="0"/>
+      </a:effectRef>
+      <a:fontRef idx="minor"/>
+    </dgm:style>
+  </dgm:styleLbl>
+  <dgm:styleLbl name="callout">
+    <dgm:scene3d>
+      <a:camera prst="orthographicFront"/>
+      <a:lightRig rig="threePt" dir="t"/>
+    </dgm:scene3d>
+    <dgm:sp3d/>
+    <dgm:txPr/>
+    <dgm:style>
+      <a:lnRef idx="2">
+        <a:scrgbClr r="0" g="0" b="0"/>
+      </a:lnRef>
+      <a:fillRef idx="1">
+        <a:scrgbClr r="0" g="0" b="0"/>
+      </a:fillRef>
+      <a:effectRef idx="0">
+        <a:scrgbClr r="0" g="0" b="0"/>
+      </a:effectRef>
+      <a:fontRef idx="minor"/>
+    </dgm:style>
+  </dgm:styleLbl>
+  <dgm:styleLbl name="asst0">
+    <dgm:scene3d>
+      <a:camera prst="orthographicFront"/>
+      <a:lightRig rig="threePt" dir="t"/>
+    </dgm:scene3d>
+    <dgm:sp3d/>
+    <dgm:txPr/>
+    <dgm:style>
+      <a:lnRef idx="2">
+        <a:scrgbClr r="0" g="0" b="0"/>
+      </a:lnRef>
+      <a:fillRef idx="1">
+        <a:scrgbClr r="0" g="0" b="0"/>
+      </a:fillRef>
+      <a:effectRef idx="0">
+        <a:scrgbClr r="0" g="0" b="0"/>
+      </a:effectRef>
+      <a:fontRef idx="minor">
+        <a:schemeClr val="lt1"/>
+      </a:fontRef>
+    </dgm:style>
+  </dgm:styleLbl>
+  <dgm:styleLbl name="asst1">
+    <dgm:scene3d>
+      <a:camera prst="orthographicFront"/>
+      <a:lightRig rig="threePt" dir="t"/>
+    </dgm:scene3d>
+    <dgm:sp3d/>
+    <dgm:txPr/>
+    <dgm:style>
+      <a:lnRef idx="2">
+        <a:scrgbClr r="0" g="0" b="0"/>
+      </a:lnRef>
+      <a:fillRef idx="1">
+        <a:scrgbClr r="0" g="0" b="0"/>
+      </a:fillRef>
+      <a:effectRef idx="0">
+        <a:scrgbClr r="0" g="0" b="0"/>
+      </a:effectRef>
+      <a:fontRef idx="minor">
+        <a:schemeClr val="lt1"/>
+      </a:fontRef>
+    </dgm:style>
+  </dgm:styleLbl>
+  <dgm:styleLbl name="asst2">
+    <dgm:scene3d>
+      <a:camera prst="orthographicFront"/>
+      <a:lightRig rig="threePt" dir="t"/>
+    </dgm:scene3d>
+    <dgm:sp3d/>
+    <dgm:txPr/>
+    <dgm:style>
+      <a:lnRef idx="2">
+        <a:scrgbClr r="0" g="0" b="0"/>
+      </a:lnRef>
+      <a:fillRef idx="1">
+        <a:scrgbClr r="0" g="0" b="0"/>
+      </a:fillRef>
+      <a:effectRef idx="0">
+        <a:scrgbClr r="0" g="0" b="0"/>
+      </a:effectRef>
+      <a:fontRef idx="minor">
+        <a:schemeClr val="lt1"/>
+      </a:fontRef>
+    </dgm:style>
+  </dgm:styleLbl>
+  <dgm:styleLbl name="asst3">
+    <dgm:scene3d>
+      <a:camera prst="orthographicFront"/>
+      <a:lightRig rig="threePt" dir="t"/>
+    </dgm:scene3d>
+    <dgm:sp3d/>
+    <dgm:txPr/>
+    <dgm:style>
+      <a:lnRef idx="2">
+        <a:scrgbClr r="0" g="0" b="0"/>
+      </a:lnRef>
+      <a:fillRef idx="1">
+        <a:scrgbClr r="0" g="0" b="0"/>
+      </a:fillRef>
+      <a:effectRef idx="0">
+        <a:scrgbClr r="0" g="0" b="0"/>
+      </a:effectRef>
+      <a:fontRef idx="minor">
+        <a:schemeClr val="lt1"/>
+      </a:fontRef>
+    </dgm:style>
+  </dgm:styleLbl>
+  <dgm:styleLbl name="asst4">
+    <dgm:scene3d>
+      <a:camera prst="orthographicFront"/>
+      <a:lightRig rig="threePt" dir="t"/>
+    </dgm:scene3d>
+    <dgm:sp3d/>
+    <dgm:txPr/>
+    <dgm:style>
+      <a:lnRef idx="2">
+        <a:scrgbClr r="0" g="0" b="0"/>
+      </a:lnRef>
+      <a:fillRef idx="1">
+        <a:scrgbClr r="0" g="0" b="0"/>
+      </a:fillRef>
+      <a:effectRef idx="0">
+        <a:scrgbClr r="0" g="0" b="0"/>
+      </a:effectRef>
+      <a:fontRef idx="minor">
+        <a:schemeClr val="lt1"/>
+      </a:fontRef>
+    </dgm:style>
+  </dgm:styleLbl>
+  <dgm:styleLbl name="parChTrans2D1">
+    <dgm:scene3d>
+      <a:camera prst="orthographicFront"/>
+      <a:lightRig rig="threePt" dir="t"/>
+    </dgm:scene3d>
+    <dgm:sp3d/>
+    <dgm:txPr/>
+    <dgm:style>
+      <a:lnRef idx="2">
+        <a:scrgbClr r="0" g="0" b="0"/>
+      </a:lnRef>
+      <a:fillRef idx="1">
+        <a:scrgbClr r="0" g="0" b="0"/>
+      </a:fillRef>
+      <a:effectRef idx="0">
+        <a:scrgbClr r="0" g="0" b="0"/>
+      </a:effectRef>
+      <a:fontRef idx="minor">
+        <a:schemeClr val="lt1"/>
+      </a:fontRef>
+    </dgm:style>
+  </dgm:styleLbl>
+  <dgm:styleLbl name="parChTrans2D2">
+    <dgm:scene3d>
+      <a:camera prst="orthographicFront"/>
+      <a:lightRig rig="threePt" dir="t"/>
+    </dgm:scene3d>
+    <dgm:sp3d/>
+    <dgm:txPr/>
+    <dgm:style>
+      <a:lnRef idx="2">
+        <a:scrgbClr r="0" g="0" b="0"/>
+      </a:lnRef>
+      <a:fillRef idx="1">
+        <a:scrgbClr r="0" g="0" b="0"/>
+      </a:fillRef>
+      <a:effectRef idx="0">
+        <a:scrgbClr r="0" g="0" b="0"/>
+      </a:effectRef>
+      <a:fontRef idx="minor">
+        <a:schemeClr val="lt1"/>
+      </a:fontRef>
+    </dgm:style>
+  </dgm:styleLbl>
+  <dgm:styleLbl name="parChTrans2D3">
+    <dgm:scene3d>
+      <a:camera prst="orthographicFront"/>
+      <a:lightRig rig="threePt" dir="t"/>
+    </dgm:scene3d>
+    <dgm:sp3d/>
+    <dgm:txPr/>
+    <dgm:style>
+      <a:lnRef idx="2">
+        <a:scrgbClr r="0" g="0" b="0"/>
+      </a:lnRef>
+      <a:fillRef idx="1">
+        <a:scrgbClr r="0" g="0" b="0"/>
+      </a:fillRef>
+      <a:effectRef idx="0">
+        <a:scrgbClr r="0" g="0" b="0"/>
+      </a:effectRef>
+      <a:fontRef idx="minor">
+        <a:schemeClr val="lt1"/>
+      </a:fontRef>
+    </dgm:style>
+  </dgm:styleLbl>
+  <dgm:styleLbl name="parChTrans2D4">
+    <dgm:scene3d>
+      <a:camera prst="orthographicFront"/>
+      <a:lightRig rig="threePt" dir="t"/>
+    </dgm:scene3d>
+    <dgm:sp3d/>
+    <dgm:txPr/>
+    <dgm:style>
+      <a:lnRef idx="2">
+        <a:scrgbClr r="0" g="0" b="0"/>
+      </a:lnRef>
+      <a:fillRef idx="1">
+        <a:scrgbClr r="0" g="0" b="0"/>
+      </a:fillRef>
+      <a:effectRef idx="0">
+        <a:scrgbClr r="0" g="0" b="0"/>
+      </a:effectRef>
+      <a:fontRef idx="minor">
+        <a:schemeClr val="lt1"/>
+      </a:fontRef>
+    </dgm:style>
+  </dgm:styleLbl>
+  <dgm:styleLbl name="parChTrans1D1">
+    <dgm:scene3d>
+      <a:camera prst="orthographicFront"/>
+      <a:lightRig rig="threePt" dir="t"/>
+    </dgm:scene3d>
+    <dgm:sp3d/>
+    <dgm:txPr/>
+    <dgm:style>
+      <a:lnRef idx="2">
+        <a:scrgbClr r="0" g="0" b="0"/>
+      </a:lnRef>
+      <a:fillRef idx="0">
+        <a:scrgbClr r="0" g="0" b="0"/>
+      </a:fillRef>
+      <a:effectRef idx="0">
+        <a:scrgbClr r="0" g="0" b="0"/>
+      </a:effectRef>
+      <a:fontRef idx="minor"/>
+    </dgm:style>
+  </dgm:styleLbl>
+  <dgm:styleLbl name="parChTrans1D2">
+    <dgm:scene3d>
+      <a:camera prst="orthographicFront"/>
+      <a:lightRig rig="threePt" dir="t"/>
+    </dgm:scene3d>
+    <dgm:sp3d/>
+    <dgm:txPr/>
+    <dgm:style>
+      <a:lnRef idx="2">
+        <a:scrgbClr r="0" g="0" b="0"/>
+      </a:lnRef>
+      <a:fillRef idx="0">
+        <a:scrgbClr r="0" g="0" b="0"/>
+      </a:fillRef>
+      <a:effectRef idx="0">
+        <a:scrgbClr r="0" g="0" b="0"/>
+      </a:effectRef>
+      <a:fontRef idx="minor"/>
+    </dgm:style>
+  </dgm:styleLbl>
+  <dgm:styleLbl name="parChTrans1D3">
+    <dgm:scene3d>
+      <a:camera prst="orthographicFront"/>
+      <a:lightRig rig="threePt" dir="t"/>
+    </dgm:scene3d>
+    <dgm:sp3d/>
+    <dgm:txPr/>
+    <dgm:style>
+      <a:lnRef idx="2">
+        <a:scrgbClr r="0" g="0" b="0"/>
+      </a:lnRef>
+      <a:fillRef idx="0">
+        <a:scrgbClr r="0" g="0" b="0"/>
+      </a:fillRef>
+      <a:effectRef idx="0">
+        <a:scrgbClr r="0" g="0" b="0"/>
+      </a:effectRef>
+      <a:fontRef idx="minor"/>
+    </dgm:style>
+  </dgm:styleLbl>
+  <dgm:styleLbl name="parChTrans1D4">
+    <dgm:scene3d>
+      <a:camera prst="orthographicFront"/>
+      <a:lightRig rig="threePt" dir="t"/>
+    </dgm:scene3d>
+    <dgm:sp3d/>
+    <dgm:txPr/>
+    <dgm:style>
+      <a:lnRef idx="2">
+        <a:scrgbClr r="0" g="0" b="0"/>
+      </a:lnRef>
+      <a:fillRef idx="0">
+        <a:scrgbClr r="0" g="0" b="0"/>
+      </a:fillRef>
+      <a:effectRef idx="0">
+        <a:scrgbClr r="0" g="0" b="0"/>
+      </a:effectRef>
+      <a:fontRef idx="minor"/>
+    </dgm:style>
+  </dgm:styleLbl>
+  <dgm:styleLbl name="fgAcc1">
+    <dgm:scene3d>
+      <a:camera prst="orthographicFront"/>
+      <a:lightRig rig="threePt" dir="t"/>
+    </dgm:scene3d>
+    <dgm:sp3d/>
+    <dgm:txPr/>
+    <dgm:style>
+      <a:lnRef idx="2">
+        <a:scrgbClr r="0" g="0" b="0"/>
+      </a:lnRef>
+      <a:fillRef idx="1">
+        <a:scrgbClr r="0" g="0" b="0"/>
+      </a:fillRef>
+      <a:effectRef idx="0">
+        <a:scrgbClr r="0" g="0" b="0"/>
+      </a:effectRef>
+      <a:fontRef idx="minor"/>
+    </dgm:style>
+  </dgm:styleLbl>
+  <dgm:styleLbl name="conFgAcc1">
+    <dgm:scene3d>
+      <a:camera prst="orthographicFront"/>
+      <a:lightRig rig="threePt" dir="t"/>
+    </dgm:scene3d>
+    <dgm:sp3d/>
+    <dgm:txPr/>
+    <dgm:style>
+      <a:lnRef idx="2">
+        <a:scrgbClr r="0" g="0" b="0"/>
+      </a:lnRef>
+      <a:fillRef idx="1">
+        <a:scrgbClr r="0" g="0" b="0"/>
+      </a:fillRef>
+      <a:effectRef idx="0">
+        <a:scrgbClr r="0" g="0" b="0"/>
+      </a:effectRef>
+      <a:fontRef idx="minor"/>
+    </dgm:style>
+  </dgm:styleLbl>
+  <dgm:styleLbl name="alignAcc1">
+    <dgm:scene3d>
+      <a:camera prst="orthographicFront"/>
+      <a:lightRig rig="threePt" dir="t"/>
+    </dgm:scene3d>
+    <dgm:sp3d/>
+    <dgm:txPr/>
+    <dgm:style>
+      <a:lnRef idx="2">
+        <a:scrgbClr r="0" g="0" b="0"/>
+      </a:lnRef>
+      <a:fillRef idx="1">
+        <a:scrgbClr r="0" g="0" b="0"/>
+      </a:fillRef>
+      <a:effectRef idx="0">
+        <a:scrgbClr r="0" g="0" b="0"/>
+      </a:effectRef>
+      <a:fontRef idx="minor"/>
+    </dgm:style>
+  </dgm:styleLbl>
+  <dgm:styleLbl name="trAlignAcc1">
+    <dgm:scene3d>
+      <a:camera prst="orthographicFront"/>
+      <a:lightRig rig="threePt" dir="t"/>
+    </dgm:scene3d>
+    <dgm:sp3d/>
+    <dgm:txPr/>
+    <dgm:style>
+      <a:lnRef idx="1">
+        <a:scrgbClr r="0" g="0" b="0"/>
+      </a:lnRef>
+      <a:fillRef idx="1">
+        <a:scrgbClr r="0" g="0" b="0"/>
+      </a:fillRef>
+      <a:effectRef idx="0">
+        <a:scrgbClr r="0" g="0" b="0"/>
+      </a:effectRef>
+      <a:fontRef idx="minor"/>
+    </dgm:style>
+  </dgm:styleLbl>
+  <dgm:styleLbl name="bgAcc1">
+    <dgm:scene3d>
+      <a:camera prst="orthographicFront"/>
+      <a:lightRig rig="threePt" dir="t"/>
+    </dgm:scene3d>
+    <dgm:sp3d/>
+    <dgm:txPr/>
+    <dgm:style>
+      <a:lnRef idx="2">
+        <a:scrgbClr r="0" g="0" b="0"/>
+      </a:lnRef>
+      <a:fillRef idx="1">
+        <a:scrgbClr r="0" g="0" b="0"/>
+      </a:fillRef>
+      <a:effectRef idx="0">
+        <a:scrgbClr r="0" g="0" b="0"/>
+      </a:effectRef>
+      <a:fontRef idx="minor"/>
+    </dgm:style>
+  </dgm:styleLbl>
+  <dgm:styleLbl name="solidFgAcc1">
+    <dgm:scene3d>
+      <a:camera prst="orthographicFront"/>
+      <a:lightRig rig="threePt" dir="t"/>
+    </dgm:scene3d>
+    <dgm:sp3d/>
+    <dgm:txPr/>
+    <dgm:style>
+      <a:lnRef idx="2">
+        <a:scrgbClr r="0" g="0" b="0"/>
+      </a:lnRef>
+      <a:fillRef idx="1">
+        <a:scrgbClr r="0" g="0" b="0"/>
+      </a:fillRef>
+      <a:effectRef idx="0">
+        <a:scrgbClr r="0" g="0" b="0"/>
+      </a:effectRef>
+      <a:fontRef idx="minor"/>
+    </dgm:style>
+  </dgm:styleLbl>
+  <dgm:styleLbl name="solidAlignAcc1">
+    <dgm:scene3d>
+      <a:camera prst="orthographicFront"/>
+      <a:lightRig rig="threePt" dir="t"/>
+    </dgm:scene3d>
+    <dgm:sp3d/>
+    <dgm:txPr/>
+    <dgm:style>
+      <a:lnRef idx="2">
+        <a:scrgbClr r="0" g="0" b="0"/>
+      </a:lnRef>
+      <a:fillRef idx="1">
+        <a:scrgbClr r="0" g="0" b="0"/>
+      </a:fillRef>
+      <a:effectRef idx="0">
+        <a:scrgbClr r="0" g="0" b="0"/>
+      </a:effectRef>
+      <a:fontRef idx="minor"/>
+    </dgm:style>
+  </dgm:styleLbl>
+  <dgm:styleLbl name="solidBgAcc1">
+    <dgm:scene3d>
+      <a:camera prst="orthographicFront"/>
+      <a:lightRig rig="threePt" dir="t"/>
+    </dgm:scene3d>
+    <dgm:sp3d/>
+    <dgm:txPr/>
+    <dgm:style>
+      <a:lnRef idx="2">
+        <a:scrgbClr r="0" g="0" b="0"/>
+      </a:lnRef>
+      <a:fillRef idx="1">
+        <a:scrgbClr r="0" g="0" b="0"/>
+      </a:fillRef>
+      <a:effectRef idx="0">
+        <a:scrgbClr r="0" g="0" b="0"/>
+      </a:effectRef>
+      <a:fontRef idx="minor"/>
+    </dgm:style>
+  </dgm:styleLbl>
+  <dgm:styleLbl name="fgAccFollowNode1">
+    <dgm:scene3d>
+      <a:camera prst="orthographicFront"/>
+      <a:lightRig rig="threePt" dir="t"/>
+    </dgm:scene3d>
+    <dgm:sp3d/>
+    <dgm:txPr/>
+    <dgm:style>
+      <a:lnRef idx="2">
+        <a:scrgbClr r="0" g="0" b="0"/>
+      </a:lnRef>
+      <a:fillRef idx="1">
+        <a:scrgbClr r="0" g="0" b="0"/>
+      </a:fillRef>
+      <a:effectRef idx="0">
+        <a:scrgbClr r="0" g="0" b="0"/>
+      </a:effectRef>
+      <a:fontRef idx="minor"/>
+    </dgm:style>
+  </dgm:styleLbl>
+  <dgm:styleLbl name="alignAccFollowNode1">
+    <dgm:scene3d>
+      <a:camera prst="orthographicFront"/>
+      <a:lightRig rig="threePt" dir="t"/>
+    </dgm:scene3d>
+    <dgm:sp3d/>
+    <dgm:txPr/>
+    <dgm:style>
+      <a:lnRef idx="2">
+        <a:scrgbClr r="0" g="0" b="0"/>
+      </a:lnRef>
+      <a:fillRef idx="1">
+        <a:scrgbClr r="0" g="0" b="0"/>
+      </a:fillRef>
+      <a:effectRef idx="0">
+        <a:scrgbClr r="0" g="0" b="0"/>
+      </a:effectRef>
+      <a:fontRef idx="minor"/>
+    </dgm:style>
+  </dgm:styleLbl>
+  <dgm:styleLbl name="bgAccFollowNode1">
+    <dgm:scene3d>
+      <a:camera prst="orthographicFront"/>
+      <a:lightRig rig="threePt" dir="t"/>
+    </dgm:scene3d>
+    <dgm:sp3d/>
+    <dgm:txPr/>
+    <dgm:style>
+      <a:lnRef idx="2">
+        <a:scrgbClr r="0" g="0" b="0"/>
+      </a:lnRef>
+      <a:fillRef idx="1">
+        <a:scrgbClr r="0" g="0" b="0"/>
+      </a:fillRef>
+      <a:effectRef idx="0">
+        <a:scrgbClr r="0" g="0" b="0"/>
+      </a:effectRef>
+      <a:fontRef idx="minor"/>
+    </dgm:style>
+  </dgm:styleLbl>
+  <dgm:styleLbl name="fgAcc0">
+    <dgm:scene3d>
+      <a:camera prst="orthographicFront"/>
+      <a:lightRig rig="threePt" dir="t"/>
+    </dgm:scene3d>
+    <dgm:sp3d/>
+    <dgm:txPr/>
+    <dgm:style>
+      <a:lnRef idx="2">
+        <a:scrgbClr r="0" g="0" b="0"/>
+      </a:lnRef>
+      <a:fillRef idx="1">
+        <a:scrgbClr r="0" g="0" b="0"/>
+      </a:fillRef>
+      <a:effectRef idx="0">
+        <a:scrgbClr r="0" g="0" b="0"/>
+      </a:effectRef>
+      <a:fontRef idx="minor"/>
+    </dgm:style>
+  </dgm:styleLbl>
+  <dgm:styleLbl name="fgAcc2">
+    <dgm:scene3d>
+      <a:camera prst="orthographicFront"/>
+      <a:lightRig rig="threePt" dir="t"/>
+    </dgm:scene3d>
+    <dgm:sp3d/>
+    <dgm:txPr/>
+    <dgm:style>
+      <a:lnRef idx="2">
+        <a:scrgbClr r="0" g="0" b="0"/>
+      </a:lnRef>
+      <a:fillRef idx="1">
+        <a:scrgbClr r="0" g="0" b="0"/>
+      </a:fillRef>
+      <a:effectRef idx="0">
+        <a:scrgbClr r="0" g="0" b="0"/>
+      </a:effectRef>
+      <a:fontRef idx="minor"/>
+    </dgm:style>
+  </dgm:styleLbl>
+  <dgm:styleLbl name="fgAcc3">
+    <dgm:scene3d>
+      <a:camera prst="orthographicFront"/>
+      <a:lightRig rig="threePt" dir="t"/>
+    </dgm:scene3d>
+    <dgm:sp3d/>
+    <dgm:txPr/>
+    <dgm:style>
+      <a:lnRef idx="2">
+        <a:scrgbClr r="0" g="0" b="0"/>
+      </a:lnRef>
+      <a:fillRef idx="1">
+        <a:scrgbClr r="0" g="0" b="0"/>
+      </a:fillRef>
+      <a:effectRef idx="0">
+        <a:scrgbClr r="0" g="0" b="0"/>
+      </a:effectRef>
+      <a:fontRef idx="minor"/>
+    </dgm:style>
+  </dgm:styleLbl>
+  <dgm:styleLbl name="fgAcc4">
+    <dgm:scene3d>
+      <a:camera prst="orthographicFront"/>
+      <a:lightRig rig="threePt" dir="t"/>
+    </dgm:scene3d>
+    <dgm:sp3d/>
+    <dgm:txPr/>
+    <dgm:style>
+      <a:lnRef idx="2">
+        <a:scrgbClr r="0" g="0" b="0"/>
+      </a:lnRef>
+      <a:fillRef idx="1">
+        <a:scrgbClr r="0" g="0" b="0"/>
+      </a:fillRef>
+      <a:effectRef idx="0">
+        <a:scrgbClr r="0" g="0" b="0"/>
+      </a:effectRef>
+      <a:fontRef idx="minor"/>
+    </dgm:style>
+  </dgm:styleLbl>
+  <dgm:styleLbl name="bgShp">
+    <dgm:scene3d>
+      <a:camera prst="orthographicFront"/>
+      <a:lightRig rig="threePt" dir="t"/>
+    </dgm:scene3d>
+    <dgm:sp3d/>
+    <dgm:txPr/>
+    <dgm:style>
+      <a:lnRef idx="0">
+        <a:scrgbClr r="0" g="0" b="0"/>
+      </a:lnRef>
+      <a:fillRef idx="1">
+        <a:scrgbClr r="0" g="0" b="0"/>
+      </a:fillRef>
+      <a:effectRef idx="0">
+        <a:scrgbClr r="0" g="0" b="0"/>
+      </a:effectRef>
+      <a:fontRef idx="minor"/>
+    </dgm:style>
+  </dgm:styleLbl>
+  <dgm:styleLbl name="dkBgShp">
+    <dgm:scene3d>
+      <a:camera prst="orthographicFront"/>
+      <a:lightRig rig="threePt" dir="t"/>
+    </dgm:scene3d>
+    <dgm:sp3d/>
+    <dgm:txPr/>
+    <dgm:style>
+      <a:lnRef idx="0">
+        <a:scrgbClr r="0" g="0" b="0"/>
+      </a:lnRef>
+      <a:fillRef idx="1">
+        <a:scrgbClr r="0" g="0" b="0"/>
+      </a:fillRef>
+      <a:effectRef idx="0">
+        <a:scrgbClr r="0" g="0" b="0"/>
+      </a:effectRef>
+      <a:fontRef idx="minor"/>
+    </dgm:style>
+  </dgm:styleLbl>
+  <dgm:styleLbl name="trBgShp">
+    <dgm:scene3d>
+      <a:camera prst="orthographicFront"/>
+      <a:lightRig rig="threePt" dir="t"/>
+    </dgm:scene3d>
+    <dgm:sp3d/>
+    <dgm:txPr/>
+    <dgm:style>
+      <a:lnRef idx="0">
+        <a:scrgbClr r="0" g="0" b="0"/>
+      </a:lnRef>
+      <a:fillRef idx="1">
+        <a:scrgbClr r="0" g="0" b="0"/>
+      </a:fillRef>
+      <a:effectRef idx="0">
+        <a:scrgbClr r="0" g="0" b="0"/>
+      </a:effectRef>
+      <a:fontRef idx="minor"/>
+    </dgm:style>
+  </dgm:styleLbl>
+  <dgm:styleLbl name="fgShp">
+    <dgm:scene3d>
+      <a:camera prst="orthographicFront"/>
+      <a:lightRig rig="threePt" dir="t"/>
+    </dgm:scene3d>
+    <dgm:sp3d/>
+    <dgm:txPr/>
+    <dgm:style>
+      <a:lnRef idx="2">
+        <a:scrgbClr r="0" g="0" b="0"/>
+      </a:lnRef>
+      <a:fillRef idx="1">
+        <a:scrgbClr r="0" g="0" b="0"/>
+      </a:fillRef>
+      <a:effectRef idx="0">
+        <a:scrgbClr r="0" g="0" b="0"/>
+      </a:effectRef>
+      <a:fontRef idx="minor"/>
+    </dgm:style>
+  </dgm:styleLbl>
+  <dgm:styleLbl name="revTx">
+    <dgm:scene3d>
+      <a:camera prst="orthographicFront"/>
+      <a:lightRig rig="threePt" dir="t"/>
+    </dgm:scene3d>
+    <dgm:sp3d/>
+    <dgm:txPr/>
+    <dgm:style>
+      <a:lnRef idx="0">
+        <a:scrgbClr r="0" g="0" b="0"/>
+      </a:lnRef>
+      <a:fillRef idx="0">
+        <a:scrgbClr r="0" g="0" b="0"/>
+      </a:fillRef>
+      <a:effectRef idx="0">
+        <a:scrgbClr r="0" g="0" b="0"/>
+      </a:effectRef>
+      <a:fontRef idx="minor"/>
+    </dgm:style>
+  </dgm:styleLbl>
+</dgm:styleDef>
+</file>
+
+<file path=ppt/diagrams/quickStyle3.xml><?xml version="1.0" encoding="utf-8"?>
 <dgm:styleDef xmlns:dgm="http://schemas.openxmlformats.org/drawingml/2006/diagram" xmlns:a="http://schemas.openxmlformats.org/drawingml/2006/main" uniqueId="urn:microsoft.com/office/officeart/2005/8/quickstyle/simple1">
   <dgm:title val=""/>
   <dgm:desc val=""/>
@@ -13965,6 +16255,131 @@
 <file path=ppt/slides/slide11.xml><?xml version="1.0" encoding="utf-8"?>
 <p:sld xmlns:a="http://schemas.openxmlformats.org/drawingml/2006/main" xmlns:r="http://schemas.openxmlformats.org/officeDocument/2006/relationships" xmlns:p="http://schemas.openxmlformats.org/presentationml/2006/main">
   <p:cSld>
+    <p:spTree>
+      <p:nvGrpSpPr>
+        <p:cNvPr id="1" name=""/>
+        <p:cNvGrpSpPr/>
+        <p:nvPr/>
+      </p:nvGrpSpPr>
+      <p:grpSpPr>
+        <a:xfrm>
+          <a:off x="0" y="0"/>
+          <a:ext cx="0" cy="0"/>
+          <a:chOff x="0" y="0"/>
+          <a:chExt cx="0" cy="0"/>
+        </a:xfrm>
+      </p:grpSpPr>
+      <p:sp>
+        <p:nvSpPr>
+          <p:cNvPr id="2" name="Title 1">
+            <a:extLst>
+              <a:ext uri="{FF2B5EF4-FFF2-40B4-BE49-F238E27FC236}">
+                <a16:creationId xmlns:a16="http://schemas.microsoft.com/office/drawing/2014/main" id="{1B76E772-9D0B-BBA0-C95A-110DB8F1299A}"/>
+              </a:ext>
+            </a:extLst>
+          </p:cNvPr>
+          <p:cNvSpPr>
+            <a:spLocks noGrp="1"/>
+          </p:cNvSpPr>
+          <p:nvPr>
+            <p:ph type="title"/>
+          </p:nvPr>
+        </p:nvSpPr>
+        <p:spPr/>
+        <p:txBody>
+          <a:bodyPr/>
+          <a:lstStyle/>
+          <a:p>
+            <a:r>
+              <a:rPr lang="en-US" dirty="0"/>
+              <a:t>Beneficiary ID Errors</a:t>
+            </a:r>
+          </a:p>
+        </p:txBody>
+      </p:sp>
+      <p:graphicFrame>
+        <p:nvGraphicFramePr>
+          <p:cNvPr id="4" name="Content Placeholder 3">
+            <a:extLst>
+              <a:ext uri="{FF2B5EF4-FFF2-40B4-BE49-F238E27FC236}">
+                <a16:creationId xmlns:a16="http://schemas.microsoft.com/office/drawing/2014/main" id="{7F9F22DC-F046-1F09-5409-99159AE686E5}"/>
+              </a:ext>
+            </a:extLst>
+          </p:cNvPr>
+          <p:cNvGraphicFramePr>
+            <a:graphicFrameLocks noGrp="1"/>
+          </p:cNvGraphicFramePr>
+          <p:nvPr>
+            <p:ph idx="1"/>
+            <p:extLst>
+              <p:ext uri="{D42A27DB-BD31-4B8C-83A1-F6EECF244321}">
+                <p14:modId xmlns:p14="http://schemas.microsoft.com/office/powerpoint/2010/main" val="858289731"/>
+              </p:ext>
+            </p:extLst>
+          </p:nvPr>
+        </p:nvGraphicFramePr>
+        <p:xfrm>
+          <a:off x="838200" y="1825625"/>
+          <a:ext cx="10515600" cy="4351338"/>
+        </p:xfrm>
+        <a:graphic>
+          <a:graphicData uri="http://schemas.openxmlformats.org/drawingml/2006/diagram">
+            <dgm:relIds xmlns:dgm="http://schemas.openxmlformats.org/drawingml/2006/diagram" xmlns:r="http://schemas.openxmlformats.org/officeDocument/2006/relationships" r:dm="rId2" r:lo="rId3" r:qs="rId4" r:cs="rId5"/>
+          </a:graphicData>
+        </a:graphic>
+      </p:graphicFrame>
+      <p:sp>
+        <p:nvSpPr>
+          <p:cNvPr id="5" name="TextBox 4">
+            <a:extLst>
+              <a:ext uri="{FF2B5EF4-FFF2-40B4-BE49-F238E27FC236}">
+                <a16:creationId xmlns:a16="http://schemas.microsoft.com/office/drawing/2014/main" id="{664904E7-DDFC-7594-6196-23E3E208E106}"/>
+              </a:ext>
+            </a:extLst>
+          </p:cNvPr>
+          <p:cNvSpPr txBox="1"/>
+          <p:nvPr/>
+        </p:nvSpPr>
+        <p:spPr>
+          <a:xfrm>
+            <a:off x="838200" y="6174913"/>
+            <a:ext cx="10515600" cy="461665"/>
+          </a:xfrm>
+          <a:prstGeom prst="rect">
+            <a:avLst/>
+          </a:prstGeom>
+          <a:noFill/>
+        </p:spPr>
+        <p:txBody>
+          <a:bodyPr wrap="square" rtlCol="0">
+            <a:spAutoFit/>
+          </a:bodyPr>
+          <a:lstStyle/>
+          <a:p>
+            <a:pPr algn="ctr"/>
+            <a:r>
+              <a:rPr lang="en-US" sz="2400" dirty="0"/>
+              <a:t>Need to Investigate: If same persons, why did the IDs change post migration?</a:t>
+            </a:r>
+          </a:p>
+        </p:txBody>
+      </p:sp>
+    </p:spTree>
+    <p:extLst>
+      <p:ext uri="{BB962C8B-B14F-4D97-AF65-F5344CB8AC3E}">
+        <p14:creationId xmlns:p14="http://schemas.microsoft.com/office/powerpoint/2010/main" val="506117194"/>
+      </p:ext>
+    </p:extLst>
+  </p:cSld>
+  <p:clrMapOvr>
+    <a:masterClrMapping/>
+  </p:clrMapOvr>
+</p:sld>
+</file>
+
+<file path=ppt/slides/slide12.xml><?xml version="1.0" encoding="utf-8"?>
+<p:sld xmlns:a="http://schemas.openxmlformats.org/drawingml/2006/main" xmlns:r="http://schemas.openxmlformats.org/officeDocument/2006/relationships" xmlns:p="http://schemas.openxmlformats.org/presentationml/2006/main">
+  <p:cSld>
     <p:bg>
       <p:bgPr>
         <a:solidFill>
@@ -14276,7 +16691,7 @@
 </p:sld>
 </file>
 
-<file path=ppt/slides/slide12.xml><?xml version="1.0" encoding="utf-8"?>
+<file path=ppt/slides/slide13.xml><?xml version="1.0" encoding="utf-8"?>
 <p:sld xmlns:a="http://schemas.openxmlformats.org/drawingml/2006/main" xmlns:r="http://schemas.openxmlformats.org/officeDocument/2006/relationships" xmlns:p="http://schemas.openxmlformats.org/presentationml/2006/main">
   <p:cSld>
     <p:bg>
@@ -29239,8 +31654,8 @@
           </a:graphicData>
         </a:graphic>
       </p:graphicFrame>
-      <mc:AlternateContent xmlns:mc="http://schemas.openxmlformats.org/markup-compatibility/2006">
-        <mc:Choice xmlns:cx1="http://schemas.microsoft.com/office/drawing/2015/9/8/chartex" Requires="cx1">
+      <mc:AlternateContent xmlns:mc="http://schemas.openxmlformats.org/markup-compatibility/2006" xmlns:cx1="http://schemas.microsoft.com/office/drawing/2015/9/8/chartex">
+        <mc:Choice Requires="cx1">
           <p:graphicFrame>
             <p:nvGraphicFramePr>
               <p:cNvPr id="5" name="Chart 4">
@@ -29272,7 +31687,7 @@
             </a:graphic>
           </p:graphicFrame>
         </mc:Choice>
-        <mc:Fallback>
+        <mc:Fallback xmlns="">
           <p:pic>
             <p:nvPicPr>
               <p:cNvPr id="5" name="Chart 4">
@@ -34806,6 +37221,50 @@
           </a:graphicData>
         </a:graphic>
       </p:graphicFrame>
+      <p:sp>
+        <p:nvSpPr>
+          <p:cNvPr id="3" name="TextBox 2">
+            <a:extLst>
+              <a:ext uri="{FF2B5EF4-FFF2-40B4-BE49-F238E27FC236}">
+                <a16:creationId xmlns:a16="http://schemas.microsoft.com/office/drawing/2014/main" id="{ADE9D997-0C27-1F9E-B9F6-C7FDAA1669FF}"/>
+              </a:ext>
+            </a:extLst>
+          </p:cNvPr>
+          <p:cNvSpPr txBox="1"/>
+          <p:nvPr/>
+        </p:nvSpPr>
+        <p:spPr>
+          <a:xfrm>
+            <a:off x="7331384" y="4922857"/>
+            <a:ext cx="4171993" cy="1077218"/>
+          </a:xfrm>
+          <a:prstGeom prst="rect">
+            <a:avLst/>
+          </a:prstGeom>
+          <a:noFill/>
+        </p:spPr>
+        <p:txBody>
+          <a:bodyPr wrap="square" rtlCol="0">
+            <a:spAutoFit/>
+          </a:bodyPr>
+          <a:lstStyle/>
+          <a:p>
+            <a:r>
+              <a:rPr lang="en-US" sz="1600" dirty="0"/>
+              <a:t>1,322 Beneficiary Records do not match between the Pre- &amp; Post-Migration tables.</a:t>
+            </a:r>
+          </a:p>
+          <a:p>
+            <a:endParaRPr lang="en-US" sz="1600" dirty="0"/>
+          </a:p>
+          <a:p>
+            <a:r>
+              <a:rPr lang="en-US" sz="1600" dirty="0"/>
+              <a:t>One or more data fields are out of sync.</a:t>
+            </a:r>
+          </a:p>
+        </p:txBody>
+      </p:sp>
     </p:spTree>
     <p:extLst>
       <p:ext uri="{BB962C8B-B14F-4D97-AF65-F5344CB8AC3E}">
@@ -35756,8 +38215,8 @@
           </a:p>
         </p:txBody>
       </p:sp>
-      <mc:AlternateContent xmlns:mc="http://schemas.openxmlformats.org/markup-compatibility/2006">
-        <mc:Choice xmlns:cx1="http://schemas.microsoft.com/office/drawing/2015/9/8/chartex" Requires="cx1">
+      <mc:AlternateContent xmlns:mc="http://schemas.openxmlformats.org/markup-compatibility/2006" xmlns:cx1="http://schemas.microsoft.com/office/drawing/2015/9/8/chartex">
+        <mc:Choice Requires="cx1">
           <p:graphicFrame>
             <p:nvGraphicFramePr>
               <p:cNvPr id="2" name="Chart 1">
@@ -35789,7 +38248,7 @@
             </a:graphic>
           </p:graphicFrame>
         </mc:Choice>
-        <mc:Fallback>
+        <mc:Fallback xmlns="">
           <p:pic>
             <p:nvPicPr>
               <p:cNvPr id="2" name="Chart 1">

</xml_diff>

<commit_message>
Additional enhancements to more completely accommodate project requirements. Still testing.
</commit_message>
<xml_diff>
--- a/Data Migration Analysis.pptx
+++ b/Data Migration Analysis.pptx
@@ -5354,7 +5354,7 @@
         <a:p>
           <a:r>
             <a:rPr lang="en-US" dirty="0"/>
-            <a:t>Validate</a:t>
+            <a:t>Validate &amp; Transform</a:t>
           </a:r>
         </a:p>
       </dgm:t>
@@ -6307,7 +6307,7 @@
           </a:pPr>
           <a:r>
             <a:rPr lang="en-US" sz="2500" kern="1200" dirty="0"/>
-            <a:t>Validate</a:t>
+            <a:t>Validate &amp; Transform</a:t>
           </a:r>
         </a:p>
       </dsp:txBody>
@@ -11317,7 +11317,7 @@
           <a:p>
             <a:fld id="{4197C371-377D-42B4-B603-96E3B3AFE44E}" type="datetimeFigureOut">
               <a:rPr lang="en-US" smtClean="0"/>
-              <a:t>2/11/2026</a:t>
+              <a:t>2/12/2026</a:t>
             </a:fld>
             <a:endParaRPr lang="en-US"/>
           </a:p>
@@ -11719,6 +11719,248 @@
 </p:notes>
 </file>
 
+<file path=ppt/notesSlides/notesSlide2.xml><?xml version="1.0" encoding="utf-8"?>
+<p:notes xmlns:a="http://schemas.openxmlformats.org/drawingml/2006/main" xmlns:r="http://schemas.openxmlformats.org/officeDocument/2006/relationships" xmlns:p="http://schemas.openxmlformats.org/presentationml/2006/main">
+  <p:cSld>
+    <p:spTree>
+      <p:nvGrpSpPr>
+        <p:cNvPr id="1" name=""/>
+        <p:cNvGrpSpPr/>
+        <p:nvPr/>
+      </p:nvGrpSpPr>
+      <p:grpSpPr>
+        <a:xfrm>
+          <a:off x="0" y="0"/>
+          <a:ext cx="0" cy="0"/>
+          <a:chOff x="0" y="0"/>
+          <a:chExt cx="0" cy="0"/>
+        </a:xfrm>
+      </p:grpSpPr>
+      <p:sp>
+        <p:nvSpPr>
+          <p:cNvPr id="2" name="Slide Image Placeholder 1"/>
+          <p:cNvSpPr>
+            <a:spLocks noGrp="1" noRot="1" noChangeAspect="1"/>
+          </p:cNvSpPr>
+          <p:nvPr>
+            <p:ph type="sldImg"/>
+          </p:nvPr>
+        </p:nvSpPr>
+        <p:spPr/>
+      </p:sp>
+      <p:sp>
+        <p:nvSpPr>
+          <p:cNvPr id="3" name="Notes Placeholder 2"/>
+          <p:cNvSpPr>
+            <a:spLocks noGrp="1"/>
+          </p:cNvSpPr>
+          <p:nvPr>
+            <p:ph type="body" idx="1"/>
+          </p:nvPr>
+        </p:nvSpPr>
+        <p:spPr/>
+        <p:txBody>
+          <a:bodyPr/>
+          <a:lstStyle/>
+          <a:p>
+            <a:r>
+              <a:rPr lang="en-US" sz="1200" b="0" kern="1200" dirty="0">
+                <a:solidFill>
+                  <a:schemeClr val="tx1"/>
+                </a:solidFill>
+                <a:effectLst/>
+                <a:latin typeface="+mn-lt"/>
+                <a:ea typeface="+mn-ea"/>
+                <a:cs typeface="+mn-cs"/>
+              </a:rPr>
+              <a:t>Packages in Requirements.txt: pandas, </a:t>
+            </a:r>
+            <a:r>
+              <a:rPr lang="en-US" sz="1200" b="0" kern="1200" dirty="0" err="1">
+                <a:solidFill>
+                  <a:schemeClr val="tx1"/>
+                </a:solidFill>
+                <a:effectLst/>
+                <a:latin typeface="+mn-lt"/>
+                <a:ea typeface="+mn-ea"/>
+                <a:cs typeface="+mn-cs"/>
+              </a:rPr>
+              <a:t>sqlalchemy</a:t>
+            </a:r>
+            <a:r>
+              <a:rPr lang="en-US" sz="1200" b="0" kern="1200" dirty="0">
+                <a:solidFill>
+                  <a:schemeClr val="tx1"/>
+                </a:solidFill>
+                <a:effectLst/>
+                <a:latin typeface="+mn-lt"/>
+                <a:ea typeface="+mn-ea"/>
+                <a:cs typeface="+mn-cs"/>
+              </a:rPr>
+              <a:t>, psycopg2-binary, </a:t>
+            </a:r>
+            <a:r>
+              <a:rPr lang="en-US" sz="1200" b="0" kern="1200" dirty="0" err="1">
+                <a:solidFill>
+                  <a:schemeClr val="tx1"/>
+                </a:solidFill>
+                <a:effectLst/>
+                <a:latin typeface="+mn-lt"/>
+                <a:ea typeface="+mn-ea"/>
+                <a:cs typeface="+mn-cs"/>
+              </a:rPr>
+              <a:t>pytest</a:t>
+            </a:r>
+            <a:r>
+              <a:rPr lang="en-US" sz="1200" b="0" kern="1200" dirty="0">
+                <a:solidFill>
+                  <a:schemeClr val="tx1"/>
+                </a:solidFill>
+                <a:effectLst/>
+                <a:latin typeface="+mn-lt"/>
+                <a:ea typeface="+mn-ea"/>
+                <a:cs typeface="+mn-cs"/>
+              </a:rPr>
+              <a:t>, tabulate, </a:t>
+            </a:r>
+            <a:r>
+              <a:rPr lang="en-US" sz="1200" b="0" kern="1200" dirty="0" err="1">
+                <a:solidFill>
+                  <a:schemeClr val="tx1"/>
+                </a:solidFill>
+                <a:effectLst/>
+                <a:latin typeface="+mn-lt"/>
+                <a:ea typeface="+mn-ea"/>
+                <a:cs typeface="+mn-cs"/>
+              </a:rPr>
+              <a:t>scipy</a:t>
+            </a:r>
+            <a:r>
+              <a:rPr lang="en-US" sz="1200" b="0" kern="1200" dirty="0">
+                <a:solidFill>
+                  <a:schemeClr val="tx1"/>
+                </a:solidFill>
+                <a:effectLst/>
+                <a:latin typeface="+mn-lt"/>
+                <a:ea typeface="+mn-ea"/>
+                <a:cs typeface="+mn-cs"/>
+              </a:rPr>
+              <a:t>, </a:t>
+            </a:r>
+            <a:r>
+              <a:rPr lang="en-US" sz="1200" b="0" kern="1200" dirty="0" err="1">
+                <a:solidFill>
+                  <a:schemeClr val="tx1"/>
+                </a:solidFill>
+                <a:effectLst/>
+                <a:latin typeface="+mn-lt"/>
+                <a:ea typeface="+mn-ea"/>
+                <a:cs typeface="+mn-cs"/>
+              </a:rPr>
+              <a:t>numpy</a:t>
+            </a:r>
+            <a:r>
+              <a:rPr lang="en-US" sz="1200" b="0" kern="1200" dirty="0">
+                <a:solidFill>
+                  <a:schemeClr val="tx1"/>
+                </a:solidFill>
+                <a:effectLst/>
+                <a:latin typeface="+mn-lt"/>
+                <a:ea typeface="+mn-ea"/>
+                <a:cs typeface="+mn-cs"/>
+              </a:rPr>
+              <a:t>, </a:t>
+            </a:r>
+            <a:r>
+              <a:rPr lang="en-US" sz="1200" b="0" kern="1200" dirty="0" err="1">
+                <a:solidFill>
+                  <a:schemeClr val="tx1"/>
+                </a:solidFill>
+                <a:effectLst/>
+                <a:latin typeface="+mn-lt"/>
+                <a:ea typeface="+mn-ea"/>
+                <a:cs typeface="+mn-cs"/>
+              </a:rPr>
+              <a:t>duckdb</a:t>
+            </a:r>
+            <a:r>
+              <a:rPr lang="en-US" sz="1200" b="0" kern="1200" dirty="0">
+                <a:solidFill>
+                  <a:schemeClr val="tx1"/>
+                </a:solidFill>
+                <a:effectLst/>
+                <a:latin typeface="+mn-lt"/>
+                <a:ea typeface="+mn-ea"/>
+                <a:cs typeface="+mn-cs"/>
+              </a:rPr>
+              <a:t>, </a:t>
+            </a:r>
+            <a:r>
+              <a:rPr lang="en-US" sz="1200" b="0" kern="1200" dirty="0" err="1">
+                <a:solidFill>
+                  <a:schemeClr val="tx1"/>
+                </a:solidFill>
+                <a:effectLst/>
+                <a:latin typeface="+mn-lt"/>
+                <a:ea typeface="+mn-ea"/>
+                <a:cs typeface="+mn-cs"/>
+              </a:rPr>
+              <a:t>duckdb</a:t>
+            </a:r>
+            <a:r>
+              <a:rPr lang="en-US" sz="1200" b="0" kern="1200" dirty="0">
+                <a:solidFill>
+                  <a:schemeClr val="tx1"/>
+                </a:solidFill>
+                <a:effectLst/>
+                <a:latin typeface="+mn-lt"/>
+                <a:ea typeface="+mn-ea"/>
+                <a:cs typeface="+mn-cs"/>
+              </a:rPr>
+              <a:t>-engine</a:t>
+            </a:r>
+          </a:p>
+          <a:p>
+            <a:endParaRPr lang="en-US" dirty="0"/>
+          </a:p>
+        </p:txBody>
+      </p:sp>
+      <p:sp>
+        <p:nvSpPr>
+          <p:cNvPr id="4" name="Slide Number Placeholder 3"/>
+          <p:cNvSpPr>
+            <a:spLocks noGrp="1"/>
+          </p:cNvSpPr>
+          <p:nvPr>
+            <p:ph type="sldNum" sz="quarter" idx="5"/>
+          </p:nvPr>
+        </p:nvSpPr>
+        <p:spPr/>
+        <p:txBody>
+          <a:bodyPr/>
+          <a:lstStyle/>
+          <a:p>
+            <a:fld id="{A9BF846D-1B31-4DC0-9BDF-7C7FAF0322F3}" type="slidenum">
+              <a:rPr lang="en-US" smtClean="0"/>
+              <a:t>13</a:t>
+            </a:fld>
+            <a:endParaRPr lang="en-US"/>
+          </a:p>
+        </p:txBody>
+      </p:sp>
+    </p:spTree>
+    <p:extLst>
+      <p:ext uri="{BB962C8B-B14F-4D97-AF65-F5344CB8AC3E}">
+        <p14:creationId xmlns:p14="http://schemas.microsoft.com/office/powerpoint/2010/main" val="3826016370"/>
+      </p:ext>
+    </p:extLst>
+  </p:cSld>
+  <p:clrMapOvr>
+    <a:masterClrMapping/>
+  </p:clrMapOvr>
+</p:notes>
+</file>
+
 <file path=ppt/slideLayouts/slideLayout1.xml><?xml version="1.0" encoding="utf-8"?>
 <p:sldLayout xmlns:a="http://schemas.openxmlformats.org/drawingml/2006/main" xmlns:r="http://schemas.openxmlformats.org/officeDocument/2006/relationships" xmlns:p="http://schemas.openxmlformats.org/presentationml/2006/main" type="title" preserve="1">
   <p:cSld name="Title Slide">
@@ -11866,7 +12108,7 @@
           <a:p>
             <a:fld id="{82141ACE-BD5A-498F-9D25-459E6F8C94AF}" type="datetimeFigureOut">
               <a:rPr lang="en-US" smtClean="0"/>
-              <a:t>2/11/2026</a:t>
+              <a:t>2/12/2026</a:t>
             </a:fld>
             <a:endParaRPr lang="en-US"/>
           </a:p>
@@ -12064,7 +12306,7 @@
           <a:p>
             <a:fld id="{82141ACE-BD5A-498F-9D25-459E6F8C94AF}" type="datetimeFigureOut">
               <a:rPr lang="en-US" smtClean="0"/>
-              <a:t>2/11/2026</a:t>
+              <a:t>2/12/2026</a:t>
             </a:fld>
             <a:endParaRPr lang="en-US"/>
           </a:p>
@@ -12272,7 +12514,7 @@
           <a:p>
             <a:fld id="{82141ACE-BD5A-498F-9D25-459E6F8C94AF}" type="datetimeFigureOut">
               <a:rPr lang="en-US" smtClean="0"/>
-              <a:t>2/11/2026</a:t>
+              <a:t>2/12/2026</a:t>
             </a:fld>
             <a:endParaRPr lang="en-US"/>
           </a:p>
@@ -12470,7 +12712,7 @@
           <a:p>
             <a:fld id="{82141ACE-BD5A-498F-9D25-459E6F8C94AF}" type="datetimeFigureOut">
               <a:rPr lang="en-US" smtClean="0"/>
-              <a:t>2/11/2026</a:t>
+              <a:t>2/12/2026</a:t>
             </a:fld>
             <a:endParaRPr lang="en-US"/>
           </a:p>
@@ -12745,7 +12987,7 @@
           <a:p>
             <a:fld id="{82141ACE-BD5A-498F-9D25-459E6F8C94AF}" type="datetimeFigureOut">
               <a:rPr lang="en-US" smtClean="0"/>
-              <a:t>2/11/2026</a:t>
+              <a:t>2/12/2026</a:t>
             </a:fld>
             <a:endParaRPr lang="en-US"/>
           </a:p>
@@ -13010,7 +13252,7 @@
           <a:p>
             <a:fld id="{82141ACE-BD5A-498F-9D25-459E6F8C94AF}" type="datetimeFigureOut">
               <a:rPr lang="en-US" smtClean="0"/>
-              <a:t>2/11/2026</a:t>
+              <a:t>2/12/2026</a:t>
             </a:fld>
             <a:endParaRPr lang="en-US"/>
           </a:p>
@@ -13422,7 +13664,7 @@
           <a:p>
             <a:fld id="{82141ACE-BD5A-498F-9D25-459E6F8C94AF}" type="datetimeFigureOut">
               <a:rPr lang="en-US" smtClean="0"/>
-              <a:t>2/11/2026</a:t>
+              <a:t>2/12/2026</a:t>
             </a:fld>
             <a:endParaRPr lang="en-US"/>
           </a:p>
@@ -13563,7 +13805,7 @@
           <a:p>
             <a:fld id="{82141ACE-BD5A-498F-9D25-459E6F8C94AF}" type="datetimeFigureOut">
               <a:rPr lang="en-US" smtClean="0"/>
-              <a:t>2/11/2026</a:t>
+              <a:t>2/12/2026</a:t>
             </a:fld>
             <a:endParaRPr lang="en-US"/>
           </a:p>
@@ -13676,7 +13918,7 @@
           <a:p>
             <a:fld id="{82141ACE-BD5A-498F-9D25-459E6F8C94AF}" type="datetimeFigureOut">
               <a:rPr lang="en-US" smtClean="0"/>
-              <a:t>2/11/2026</a:t>
+              <a:t>2/12/2026</a:t>
             </a:fld>
             <a:endParaRPr lang="en-US"/>
           </a:p>
@@ -13987,7 +14229,7 @@
           <a:p>
             <a:fld id="{82141ACE-BD5A-498F-9D25-459E6F8C94AF}" type="datetimeFigureOut">
               <a:rPr lang="en-US" smtClean="0"/>
-              <a:t>2/11/2026</a:t>
+              <a:t>2/12/2026</a:t>
             </a:fld>
             <a:endParaRPr lang="en-US"/>
           </a:p>
@@ -14275,7 +14517,7 @@
           <a:p>
             <a:fld id="{82141ACE-BD5A-498F-9D25-459E6F8C94AF}" type="datetimeFigureOut">
               <a:rPr lang="en-US" smtClean="0"/>
-              <a:t>2/11/2026</a:t>
+              <a:t>2/12/2026</a:t>
             </a:fld>
             <a:endParaRPr lang="en-US"/>
           </a:p>
@@ -14516,7 +14758,7 @@
           <a:p>
             <a:fld id="{82141ACE-BD5A-498F-9D25-459E6F8C94AF}" type="datetimeFigureOut">
               <a:rPr lang="en-US" smtClean="0"/>
-              <a:t>2/11/2026</a:t>
+              <a:t>2/12/2026</a:t>
             </a:fld>
             <a:endParaRPr lang="en-US"/>
           </a:p>
@@ -16800,8 +17042,8 @@
         </p:nvSpPr>
         <p:spPr>
           <a:xfrm>
-            <a:off x="6981825" y="1641752"/>
-            <a:ext cx="4391024" cy="1323439"/>
+            <a:off x="6981826" y="808175"/>
+            <a:ext cx="4391024" cy="898248"/>
           </a:xfrm>
         </p:spPr>
         <p:txBody>
@@ -16811,7 +17053,7 @@
           <a:lstStyle/>
           <a:p>
             <a:r>
-              <a:rPr lang="en-US" sz="4000" kern="1200">
+              <a:rPr lang="en-US" sz="4000" kern="1200" dirty="0">
                 <a:solidFill>
                   <a:schemeClr val="bg1"/>
                 </a:solidFill>
@@ -25684,7 +25926,7 @@
                 </a:pathLst>
               </a:custGeom>
               <a:blipFill dpi="0" rotWithShape="1">
-                <a:blip r:embed="rId2">
+                <a:blip r:embed="rId3">
                   <a:alphaModFix amt="57000"/>
                 </a:blip>
                 <a:srcRect/>
@@ -25738,8 +25980,8 @@
         </p:nvSpPr>
         <p:spPr>
           <a:xfrm>
-            <a:off x="6981826" y="2667573"/>
-            <a:ext cx="4391024" cy="2933127"/>
+            <a:off x="6981826" y="1498600"/>
+            <a:ext cx="4391024" cy="4102101"/>
           </a:xfrm>
           <a:prstGeom prst="rect">
             <a:avLst/>
@@ -25747,7 +25989,7 @@
         </p:spPr>
         <p:txBody>
           <a:bodyPr vert="horz" lIns="91440" tIns="45720" rIns="91440" bIns="45720" rtlCol="0">
-            <a:normAutofit lnSpcReduction="10000"/>
+            <a:normAutofit/>
           </a:bodyPr>
           <a:lstStyle/>
           <a:p>
@@ -25769,7 +26011,7 @@
                   </a:schemeClr>
                 </a:solidFill>
               </a:rPr>
-              <a:t>Jeffrey designed the queries and set the approach used for the data analysis and developed the presentation.</a:t>
+              <a:t>Jeffrey designed the queries and set the approach used for the entire pipeline, analytical engine, outputs, etc.</a:t>
             </a:r>
           </a:p>
           <a:p>
@@ -25791,7 +26033,7 @@
                   </a:schemeClr>
                 </a:solidFill>
               </a:rPr>
-              <a:t>AI assisted with code syntax consultation, “Human in the Loop” environment set-up &amp; data ingestion, and PDF Summarization.</a:t>
+              <a:t>AI assistance: “Human in the Loop” code syntax, environment set-up , data ingestion, and PDF Summarization.</a:t>
             </a:r>
           </a:p>
           <a:p>
@@ -25835,7 +26077,7 @@
                   </a:schemeClr>
                 </a:solidFill>
               </a:rPr>
-              <a:t>20 hours invested (4 hours set-up + 16 hours data exploration, analysis, and summarization). </a:t>
+              <a:t>28 hours invested (4 hours set-up + 24 hours data exploration, analysis, and summarization). </a:t>
             </a:r>
           </a:p>
           <a:p>
@@ -25857,7 +26099,7 @@
                   </a:schemeClr>
                 </a:solidFill>
               </a:rPr>
-              <a:t>16 </a:t>
+              <a:t>17 </a:t>
             </a:r>
             <a:r>
               <a:rPr lang="en-US" sz="1400" dirty="0" err="1">
@@ -25877,7 +26119,7 @@
                   </a:schemeClr>
                 </a:solidFill>
               </a:rPr>
-              <a:t> scripts (~1,350 lines of code)</a:t>
+              <a:t> scripts (~1,500 lines of code)</a:t>
             </a:r>
           </a:p>
           <a:p>
@@ -25919,7 +26161,51 @@
                   </a:schemeClr>
                 </a:solidFill>
               </a:rPr>
-              <a:t> script (~1950 lines) to transform / analyze and prepare interim / final views of the data.</a:t>
+              <a:t> script (~2,000 lines) to transform / analyze and prepare interim / final views of the data.</a:t>
+            </a:r>
+          </a:p>
+          <a:p>
+            <a:pPr indent="-228600">
+              <a:lnSpc>
+                <a:spcPct val="90000"/>
+              </a:lnSpc>
+              <a:spcAft>
+                <a:spcPts val="600"/>
+              </a:spcAft>
+              <a:buFont typeface="Arial" panose="020B0604020202020204" pitchFamily="34" charset="0"/>
+              <a:buChar char="•"/>
+            </a:pPr>
+            <a:r>
+              <a:rPr lang="en-US" sz="1400" dirty="0">
+                <a:solidFill>
+                  <a:schemeClr val="bg1">
+                    <a:alpha val="80000"/>
+                  </a:schemeClr>
+                </a:solidFill>
+              </a:rPr>
+              <a:t>Utilized “report.md” and “report.html” for automated feedback to communicate the data quality.</a:t>
+            </a:r>
+          </a:p>
+          <a:p>
+            <a:pPr indent="-228600">
+              <a:lnSpc>
+                <a:spcPct val="90000"/>
+              </a:lnSpc>
+              <a:spcAft>
+                <a:spcPts val="600"/>
+              </a:spcAft>
+              <a:buFont typeface="Arial" panose="020B0604020202020204" pitchFamily="34" charset="0"/>
+              <a:buChar char="•"/>
+            </a:pPr>
+            <a:r>
+              <a:rPr lang="en-US" sz="1400" dirty="0">
+                <a:solidFill>
+                  <a:schemeClr val="bg1">
+                    <a:alpha val="80000"/>
+                  </a:schemeClr>
+                </a:solidFill>
+              </a:rPr>
+              <a:t>Provided PowerPoint presentation to demonstrate how we would present the findings to others in a presentation format.</a:t>
             </a:r>
           </a:p>
         </p:txBody>
@@ -25940,7 +26226,7 @@
             <p:ph idx="1"/>
             <p:extLst>
               <p:ext uri="{D42A27DB-BD31-4B8C-83A1-F6EECF244321}">
-                <p14:modId xmlns:p14="http://schemas.microsoft.com/office/powerpoint/2010/main" val="310579077"/>
+                <p14:modId xmlns:p14="http://schemas.microsoft.com/office/powerpoint/2010/main" val="2167270205"/>
               </p:ext>
             </p:extLst>
           </p:nvPr>
@@ -26012,7 +26298,23 @@
                     <a:bodyPr/>
                     <a:lstStyle/>
                     <a:p>
-                      <a:pPr algn="ctr"/>
+                      <a:pPr marL="0" marR="0" lvl="0" indent="0" algn="ctr" defTabSz="914400" rtl="0" eaLnBrk="1" fontAlgn="auto" latinLnBrk="0" hangingPunct="1">
+                        <a:lnSpc>
+                          <a:spcPct val="100000"/>
+                        </a:lnSpc>
+                        <a:spcBef>
+                          <a:spcPts val="0"/>
+                        </a:spcBef>
+                        <a:spcAft>
+                          <a:spcPts val="0"/>
+                        </a:spcAft>
+                        <a:buClrTx/>
+                        <a:buSzTx/>
+                        <a:buFontTx/>
+                        <a:buNone/>
+                        <a:tabLst/>
+                        <a:defRPr/>
+                      </a:pPr>
                       <a:r>
                         <a:rPr lang="en-US" sz="1600" dirty="0"/>
                         <a:t>Python 3.13</a:t>
@@ -26021,13 +26323,13 @@
                         <a:rPr lang="en-US" sz="1600" dirty="0"/>
                       </a:br>
                       <a:r>
-                        <a:rPr lang="en-US" sz="1600" dirty="0"/>
+                        <a:rPr lang="en-US" sz="1000" dirty="0"/>
                         <a:t>(</a:t>
                       </a:r>
                       <a:r>
-                        <a:rPr lang="en-US" sz="1600" b="0" kern="1200" dirty="0">
+                        <a:rPr lang="en-US" sz="1000" b="0" kern="1200" dirty="0">
                           <a:solidFill>
-                            <a:schemeClr val="dk1"/>
+                            <a:schemeClr val="tx1"/>
                           </a:solidFill>
                           <a:effectLst/>
                           <a:latin typeface="+mn-lt"/>
@@ -26037,9 +26339,9 @@
                         <a:t>pandas, </a:t>
                       </a:r>
                       <a:r>
-                        <a:rPr lang="en-US" sz="1600" b="0" kern="1200" dirty="0" err="1">
+                        <a:rPr lang="en-US" sz="1000" b="0" kern="1200" dirty="0" err="1">
                           <a:solidFill>
-                            <a:schemeClr val="dk1"/>
+                            <a:schemeClr val="tx1"/>
                           </a:solidFill>
                           <a:effectLst/>
                           <a:latin typeface="+mn-lt"/>
@@ -26049,9 +26351,9 @@
                         <a:t>sqlalchemy</a:t>
                       </a:r>
                       <a:r>
-                        <a:rPr lang="en-US" sz="1600" b="0" kern="1200" dirty="0">
+                        <a:rPr lang="en-US" sz="1000" b="0" kern="1200" dirty="0">
                           <a:solidFill>
-                            <a:schemeClr val="dk1"/>
+                            <a:schemeClr val="tx1"/>
                           </a:solidFill>
                           <a:effectLst/>
                           <a:latin typeface="+mn-lt"/>
@@ -26061,9 +26363,9 @@
                         <a:t>, psycopg2-binary, </a:t>
                       </a:r>
                       <a:r>
-                        <a:rPr lang="en-US" sz="1600" b="0" kern="1200" dirty="0" err="1">
+                        <a:rPr lang="en-US" sz="1000" b="0" kern="1200" dirty="0" err="1">
                           <a:solidFill>
-                            <a:schemeClr val="dk1"/>
+                            <a:schemeClr val="tx1"/>
                           </a:solidFill>
                           <a:effectLst/>
                           <a:latin typeface="+mn-lt"/>
@@ -26073,7 +26375,115 @@
                         <a:t>pytest</a:t>
                       </a:r>
                       <a:r>
-                        <a:rPr lang="en-US" sz="1600" b="0" kern="1200" dirty="0">
+                        <a:rPr lang="en-US" sz="1000" b="0" kern="1200" dirty="0">
+                          <a:solidFill>
+                            <a:schemeClr val="tx1"/>
+                          </a:solidFill>
+                          <a:effectLst/>
+                          <a:latin typeface="+mn-lt"/>
+                          <a:ea typeface="+mn-ea"/>
+                          <a:cs typeface="+mn-cs"/>
+                        </a:rPr>
+                        <a:t>, tabulate, </a:t>
+                      </a:r>
+                      <a:r>
+                        <a:rPr lang="en-US" sz="1000" b="0" kern="1200" dirty="0" err="1">
+                          <a:solidFill>
+                            <a:schemeClr val="tx1"/>
+                          </a:solidFill>
+                          <a:effectLst/>
+                          <a:latin typeface="+mn-lt"/>
+                          <a:ea typeface="+mn-ea"/>
+                          <a:cs typeface="+mn-cs"/>
+                        </a:rPr>
+                        <a:t>scipy</a:t>
+                      </a:r>
+                      <a:r>
+                        <a:rPr lang="en-US" sz="1000" b="0" kern="1200" dirty="0">
+                          <a:solidFill>
+                            <a:schemeClr val="tx1"/>
+                          </a:solidFill>
+                          <a:effectLst/>
+                          <a:latin typeface="+mn-lt"/>
+                          <a:ea typeface="+mn-ea"/>
+                          <a:cs typeface="+mn-cs"/>
+                        </a:rPr>
+                        <a:t>, </a:t>
+                      </a:r>
+                      <a:r>
+                        <a:rPr lang="en-US" sz="1000" b="0" kern="1200" dirty="0" err="1">
+                          <a:solidFill>
+                            <a:schemeClr val="tx1"/>
+                          </a:solidFill>
+                          <a:effectLst/>
+                          <a:latin typeface="+mn-lt"/>
+                          <a:ea typeface="+mn-ea"/>
+                          <a:cs typeface="+mn-cs"/>
+                        </a:rPr>
+                        <a:t>numpy</a:t>
+                      </a:r>
+                      <a:r>
+                        <a:rPr lang="en-US" sz="1000" b="0" kern="1200" dirty="0">
+                          <a:solidFill>
+                            <a:schemeClr val="tx1"/>
+                          </a:solidFill>
+                          <a:effectLst/>
+                          <a:latin typeface="+mn-lt"/>
+                          <a:ea typeface="+mn-ea"/>
+                          <a:cs typeface="+mn-cs"/>
+                        </a:rPr>
+                        <a:t>, </a:t>
+                      </a:r>
+                      <a:r>
+                        <a:rPr lang="en-US" sz="1000" b="0" kern="1200" dirty="0" err="1">
+                          <a:solidFill>
+                            <a:schemeClr val="tx1"/>
+                          </a:solidFill>
+                          <a:effectLst/>
+                          <a:latin typeface="+mn-lt"/>
+                          <a:ea typeface="+mn-ea"/>
+                          <a:cs typeface="+mn-cs"/>
+                        </a:rPr>
+                        <a:t>duckdb</a:t>
+                      </a:r>
+                      <a:r>
+                        <a:rPr lang="en-US" sz="1000" b="0" kern="1200" dirty="0">
+                          <a:solidFill>
+                            <a:schemeClr val="tx1"/>
+                          </a:solidFill>
+                          <a:effectLst/>
+                          <a:latin typeface="+mn-lt"/>
+                          <a:ea typeface="+mn-ea"/>
+                          <a:cs typeface="+mn-cs"/>
+                        </a:rPr>
+                        <a:t>, </a:t>
+                      </a:r>
+                      <a:r>
+                        <a:rPr lang="en-US" sz="1000" b="0" kern="1200" dirty="0" err="1">
+                          <a:solidFill>
+                            <a:schemeClr val="tx1"/>
+                          </a:solidFill>
+                          <a:effectLst/>
+                          <a:latin typeface="+mn-lt"/>
+                          <a:ea typeface="+mn-ea"/>
+                          <a:cs typeface="+mn-cs"/>
+                        </a:rPr>
+                        <a:t>duckdb</a:t>
+                      </a:r>
+                      <a:r>
+                        <a:rPr lang="en-US" sz="1000" b="0" kern="1200" dirty="0">
+                          <a:solidFill>
+                            <a:schemeClr val="tx1"/>
+                          </a:solidFill>
+                          <a:effectLst/>
+                          <a:latin typeface="+mn-lt"/>
+                          <a:ea typeface="+mn-ea"/>
+                          <a:cs typeface="+mn-cs"/>
+                        </a:rPr>
+                        <a:t>-engine</a:t>
+                      </a:r>
+                      <a:r>
+                        <a:rPr lang="en-US" sz="1000" b="0" kern="1200" dirty="0">
                           <a:solidFill>
                             <a:schemeClr val="dk1"/>
                           </a:solidFill>
@@ -26084,6 +26494,15 @@
                         </a:rPr>
                         <a:t>)</a:t>
                       </a:r>
+                      <a:endParaRPr lang="en-US" sz="1600" b="0" kern="1200" dirty="0">
+                        <a:solidFill>
+                          <a:schemeClr val="dk1"/>
+                        </a:solidFill>
+                        <a:effectLst/>
+                        <a:latin typeface="+mn-lt"/>
+                        <a:ea typeface="+mn-ea"/>
+                        <a:cs typeface="+mn-cs"/>
+                      </a:endParaRPr>
                     </a:p>
                   </a:txBody>
                   <a:tcPr marL="97312" marR="97312" marT="48656" marB="48656" anchor="ctr"/>
@@ -27101,7 +27520,7 @@
           <p:nvPr>
             <p:extLst>
               <p:ext uri="{D42A27DB-BD31-4B8C-83A1-F6EECF244321}">
-                <p14:modId xmlns:p14="http://schemas.microsoft.com/office/powerpoint/2010/main" val="3293182464"/>
+                <p14:modId xmlns:p14="http://schemas.microsoft.com/office/powerpoint/2010/main" val="273709539"/>
               </p:ext>
             </p:extLst>
           </p:nvPr>

</xml_diff>